<commit_message>
Fatti i vincoli ( mi manca l'ultimo......)
</commit_message>
<xml_diff>
--- a/ProgettoCA_passaggi.pptx
+++ b/ProgettoCA_passaggi.pptx
@@ -5,7 +5,7 @@
     <p:sldMasterId id="2147483648" r:id="rId1"/>
   </p:sldMasterIdLst>
   <p:notesMasterIdLst>
-    <p:notesMasterId r:id="rId7"/>
+    <p:notesMasterId r:id="rId13"/>
   </p:notesMasterIdLst>
   <p:sldIdLst>
     <p:sldId id="256" r:id="rId2"/>
@@ -13,6 +13,12 @@
     <p:sldId id="258" r:id="rId4"/>
     <p:sldId id="259" r:id="rId5"/>
     <p:sldId id="260" r:id="rId6"/>
+    <p:sldId id="261" r:id="rId7"/>
+    <p:sldId id="262" r:id="rId8"/>
+    <p:sldId id="263" r:id="rId9"/>
+    <p:sldId id="264" r:id="rId10"/>
+    <p:sldId id="265" r:id="rId11"/>
+    <p:sldId id="266" r:id="rId12"/>
   </p:sldIdLst>
   <p:sldSz cx="12192000" cy="6858000"/>
   <p:notesSz cx="6858000" cy="9144000"/>
@@ -201,7 +207,7 @@
           <a:p>
             <a:fld id="{EC61CB3F-0F1A-4E3C-9B3E-A6AE34AF884C}" type="datetimeFigureOut">
               <a:rPr lang="it-IT" smtClean="0"/>
-              <a:t>07/12/2020</a:t>
+              <a:t>08/12/2020</a:t>
             </a:fld>
             <a:endParaRPr lang="it-IT"/>
           </a:p>
@@ -615,7 +621,7 @@
           <a:p>
             <a:fld id="{37083D2B-CC73-4AD4-8B34-A2D3A1E5236E}" type="datetimeFigureOut">
               <a:rPr lang="it-IT" smtClean="0"/>
-              <a:t>07/12/2020</a:t>
+              <a:t>08/12/2020</a:t>
             </a:fld>
             <a:endParaRPr lang="it-IT"/>
           </a:p>
@@ -813,7 +819,7 @@
           <a:p>
             <a:fld id="{37083D2B-CC73-4AD4-8B34-A2D3A1E5236E}" type="datetimeFigureOut">
               <a:rPr lang="it-IT" smtClean="0"/>
-              <a:t>07/12/2020</a:t>
+              <a:t>08/12/2020</a:t>
             </a:fld>
             <a:endParaRPr lang="it-IT"/>
           </a:p>
@@ -1021,7 +1027,7 @@
           <a:p>
             <a:fld id="{37083D2B-CC73-4AD4-8B34-A2D3A1E5236E}" type="datetimeFigureOut">
               <a:rPr lang="it-IT" smtClean="0"/>
-              <a:t>07/12/2020</a:t>
+              <a:t>08/12/2020</a:t>
             </a:fld>
             <a:endParaRPr lang="it-IT"/>
           </a:p>
@@ -1219,7 +1225,7 @@
           <a:p>
             <a:fld id="{37083D2B-CC73-4AD4-8B34-A2D3A1E5236E}" type="datetimeFigureOut">
               <a:rPr lang="it-IT" smtClean="0"/>
-              <a:t>07/12/2020</a:t>
+              <a:t>08/12/2020</a:t>
             </a:fld>
             <a:endParaRPr lang="it-IT"/>
           </a:p>
@@ -1494,7 +1500,7 @@
           <a:p>
             <a:fld id="{37083D2B-CC73-4AD4-8B34-A2D3A1E5236E}" type="datetimeFigureOut">
               <a:rPr lang="it-IT" smtClean="0"/>
-              <a:t>07/12/2020</a:t>
+              <a:t>08/12/2020</a:t>
             </a:fld>
             <a:endParaRPr lang="it-IT"/>
           </a:p>
@@ -1759,7 +1765,7 @@
           <a:p>
             <a:fld id="{37083D2B-CC73-4AD4-8B34-A2D3A1E5236E}" type="datetimeFigureOut">
               <a:rPr lang="it-IT" smtClean="0"/>
-              <a:t>07/12/2020</a:t>
+              <a:t>08/12/2020</a:t>
             </a:fld>
             <a:endParaRPr lang="it-IT"/>
           </a:p>
@@ -2171,7 +2177,7 @@
           <a:p>
             <a:fld id="{37083D2B-CC73-4AD4-8B34-A2D3A1E5236E}" type="datetimeFigureOut">
               <a:rPr lang="it-IT" smtClean="0"/>
-              <a:t>07/12/2020</a:t>
+              <a:t>08/12/2020</a:t>
             </a:fld>
             <a:endParaRPr lang="it-IT"/>
           </a:p>
@@ -2312,7 +2318,7 @@
           <a:p>
             <a:fld id="{37083D2B-CC73-4AD4-8B34-A2D3A1E5236E}" type="datetimeFigureOut">
               <a:rPr lang="it-IT" smtClean="0"/>
-              <a:t>07/12/2020</a:t>
+              <a:t>08/12/2020</a:t>
             </a:fld>
             <a:endParaRPr lang="it-IT"/>
           </a:p>
@@ -2425,7 +2431,7 @@
           <a:p>
             <a:fld id="{37083D2B-CC73-4AD4-8B34-A2D3A1E5236E}" type="datetimeFigureOut">
               <a:rPr lang="it-IT" smtClean="0"/>
-              <a:t>07/12/2020</a:t>
+              <a:t>08/12/2020</a:t>
             </a:fld>
             <a:endParaRPr lang="it-IT"/>
           </a:p>
@@ -2736,7 +2742,7 @@
           <a:p>
             <a:fld id="{37083D2B-CC73-4AD4-8B34-A2D3A1E5236E}" type="datetimeFigureOut">
               <a:rPr lang="it-IT" smtClean="0"/>
-              <a:t>07/12/2020</a:t>
+              <a:t>08/12/2020</a:t>
             </a:fld>
             <a:endParaRPr lang="it-IT"/>
           </a:p>
@@ -3024,7 +3030,7 @@
           <a:p>
             <a:fld id="{37083D2B-CC73-4AD4-8B34-A2D3A1E5236E}" type="datetimeFigureOut">
               <a:rPr lang="it-IT" smtClean="0"/>
-              <a:t>07/12/2020</a:t>
+              <a:t>08/12/2020</a:t>
             </a:fld>
             <a:endParaRPr lang="it-IT"/>
           </a:p>
@@ -3265,7 +3271,7 @@
           <a:p>
             <a:fld id="{37083D2B-CC73-4AD4-8B34-A2D3A1E5236E}" type="datetimeFigureOut">
               <a:rPr lang="it-IT" smtClean="0"/>
-              <a:t>07/12/2020</a:t>
+              <a:t>08/12/2020</a:t>
             </a:fld>
             <a:endParaRPr lang="it-IT"/>
           </a:p>
@@ -3752,6 +3758,515 @@
     <p:extLst>
       <p:ext uri="{BB962C8B-B14F-4D97-AF65-F5344CB8AC3E}">
         <p14:creationId xmlns:p14="http://schemas.microsoft.com/office/powerpoint/2010/main" val="397948801"/>
+      </p:ext>
+    </p:extLst>
+  </p:cSld>
+  <p:clrMapOvr>
+    <a:masterClrMapping/>
+  </p:clrMapOvr>
+</p:sld>
+</file>
+
+<file path=ppt/slides/slide10.xml><?xml version="1.0" encoding="utf-8"?>
+<p:sld xmlns:a="http://schemas.openxmlformats.org/drawingml/2006/main" xmlns:r="http://schemas.openxmlformats.org/officeDocument/2006/relationships" xmlns:p="http://schemas.openxmlformats.org/presentationml/2006/main">
+  <p:cSld>
+    <p:spTree>
+      <p:nvGrpSpPr>
+        <p:cNvPr id="1" name=""/>
+        <p:cNvGrpSpPr/>
+        <p:nvPr/>
+      </p:nvGrpSpPr>
+      <p:grpSpPr>
+        <a:xfrm>
+          <a:off x="0" y="0"/>
+          <a:ext cx="0" cy="0"/>
+          <a:chOff x="0" y="0"/>
+          <a:chExt cx="0" cy="0"/>
+        </a:xfrm>
+      </p:grpSpPr>
+      <mc:AlternateContent xmlns:mc="http://schemas.openxmlformats.org/markup-compatibility/2006">
+        <mc:Choice xmlns:a14="http://schemas.microsoft.com/office/drawing/2010/main" Requires="a14">
+          <p:sp>
+            <p:nvSpPr>
+              <p:cNvPr id="2" name="Titolo 1">
+                <a:extLst>
+                  <a:ext uri="{FF2B5EF4-FFF2-40B4-BE49-F238E27FC236}">
+                    <a16:creationId xmlns:a16="http://schemas.microsoft.com/office/drawing/2014/main" id="{1664688C-F760-447B-9170-256507121AE8}"/>
+                  </a:ext>
+                </a:extLst>
+              </p:cNvPr>
+              <p:cNvSpPr>
+                <a:spLocks noGrp="1"/>
+              </p:cNvSpPr>
+              <p:nvPr>
+                <p:ph type="title"/>
+              </p:nvPr>
+            </p:nvSpPr>
+            <p:spPr>
+              <a:xfrm>
+                <a:off x="838200" y="365125"/>
+                <a:ext cx="10515600" cy="6159962"/>
+              </a:xfrm>
+            </p:spPr>
+            <p:txBody>
+              <a:bodyPr>
+                <a:normAutofit/>
+              </a:bodyPr>
+              <a:lstStyle/>
+              <a:p>
+                <a:r>
+                  <a:rPr lang="it-IT" dirty="0"/>
+                  <a:t>Vincolo 4</a:t>
+                </a:r>
+                <a:br>
+                  <a:rPr lang="it-IT" dirty="0"/>
+                </a:br>
+                <a:r>
+                  <a:rPr lang="it-IT" dirty="0"/>
+                  <a:t>Tempo di assestamento all’1% inferiore al 0.3;</a:t>
+                </a:r>
+                <a:br>
+                  <a:rPr lang="it-IT" dirty="0"/>
+                </a:br>
+                <a:br>
+                  <a:rPr lang="it-IT" dirty="0"/>
+                </a:br>
+                <a:r>
+                  <a:rPr lang="it-IT" dirty="0"/>
+                  <a:t>Questa specifica influisce invece sulla </a:t>
+                </a:r>
+                <a14:m>
+                  <m:oMath xmlns:m="http://schemas.openxmlformats.org/officeDocument/2006/math">
+                    <m:sSub>
+                      <m:sSubPr>
+                        <m:ctrlPr>
+                          <a:rPr lang="it-IT" i="1" smtClean="0">
+                            <a:latin typeface="Cambria Math" panose="02040503050406030204" pitchFamily="18" charset="0"/>
+                          </a:rPr>
+                        </m:ctrlPr>
+                      </m:sSubPr>
+                      <m:e>
+                        <m:r>
+                          <a:rPr lang="it-IT" b="0" i="1" smtClean="0">
+                            <a:latin typeface="Cambria Math" panose="02040503050406030204" pitchFamily="18" charset="0"/>
+                          </a:rPr>
+                          <m:t>𝑤</m:t>
+                        </m:r>
+                      </m:e>
+                      <m:sub>
+                        <m:r>
+                          <a:rPr lang="it-IT" b="0" i="1" smtClean="0">
+                            <a:latin typeface="Cambria Math" panose="02040503050406030204" pitchFamily="18" charset="0"/>
+                          </a:rPr>
+                          <m:t>𝑐</m:t>
+                        </m:r>
+                      </m:sub>
+                    </m:sSub>
+                  </m:oMath>
+                </a14:m>
+                <a:br>
+                  <a:rPr lang="it-IT" dirty="0"/>
+                </a:br>
+                <a:r>
+                  <a:rPr lang="it-IT" dirty="0"/>
+                  <a:t>o meglio sulla </a:t>
+                </a:r>
+                <a14:m>
+                  <m:oMath xmlns:m="http://schemas.openxmlformats.org/officeDocument/2006/math">
+                    <m:sSub>
+                      <m:sSubPr>
+                        <m:ctrlPr>
+                          <a:rPr lang="it-IT" i="1" smtClean="0">
+                            <a:latin typeface="Cambria Math" panose="02040503050406030204" pitchFamily="18" charset="0"/>
+                          </a:rPr>
+                        </m:ctrlPr>
+                      </m:sSubPr>
+                      <m:e>
+                        <m:r>
+                          <a:rPr lang="it-IT" b="0" i="1" smtClean="0">
+                            <a:latin typeface="Cambria Math" panose="02040503050406030204" pitchFamily="18" charset="0"/>
+                          </a:rPr>
+                          <m:t>𝑤</m:t>
+                        </m:r>
+                      </m:e>
+                      <m:sub>
+                        <m:r>
+                          <a:rPr lang="it-IT" b="0" i="1" smtClean="0">
+                            <a:latin typeface="Cambria Math" panose="02040503050406030204" pitchFamily="18" charset="0"/>
+                          </a:rPr>
+                          <m:t>𝑐</m:t>
+                        </m:r>
+                        <m:r>
+                          <a:rPr lang="it-IT" b="0" i="1" smtClean="0">
+                            <a:latin typeface="Cambria Math" panose="02040503050406030204" pitchFamily="18" charset="0"/>
+                          </a:rPr>
+                          <m:t>,</m:t>
+                        </m:r>
+                        <m:r>
+                          <a:rPr lang="it-IT" b="0" i="1" smtClean="0">
+                            <a:latin typeface="Cambria Math" panose="02040503050406030204" pitchFamily="18" charset="0"/>
+                          </a:rPr>
+                          <m:t>𝑚𝑖𝑛</m:t>
+                        </m:r>
+                      </m:sub>
+                    </m:sSub>
+                    <m:r>
+                      <a:rPr lang="it-IT" b="0" i="0" smtClean="0">
+                        <a:latin typeface="Cambria Math" panose="02040503050406030204" pitchFamily="18" charset="0"/>
+                      </a:rPr>
+                      <m:t> </m:t>
+                    </m:r>
+                  </m:oMath>
+                </a14:m>
+                <a:r>
+                  <a:rPr lang="it-IT" dirty="0"/>
+                  <a:t>;</a:t>
+                </a:r>
+                <a:br>
+                  <a:rPr lang="it-IT" dirty="0"/>
+                </a:br>
+                <a:r>
+                  <a:rPr lang="it-IT" dirty="0"/>
+                  <a:t>infatti </a:t>
+                </a:r>
+                <a14:m>
+                  <m:oMath xmlns:m="http://schemas.openxmlformats.org/officeDocument/2006/math">
+                    <m:sSub>
+                      <m:sSubPr>
+                        <m:ctrlPr>
+                          <a:rPr lang="it-IT" i="1" smtClean="0">
+                            <a:latin typeface="Cambria Math" panose="02040503050406030204" pitchFamily="18" charset="0"/>
+                          </a:rPr>
+                        </m:ctrlPr>
+                      </m:sSubPr>
+                      <m:e>
+                        <m:r>
+                          <a:rPr lang="it-IT" b="0" i="1" smtClean="0">
+                            <a:latin typeface="Cambria Math" panose="02040503050406030204" pitchFamily="18" charset="0"/>
+                          </a:rPr>
+                          <m:t>𝑤</m:t>
+                        </m:r>
+                      </m:e>
+                      <m:sub>
+                        <m:r>
+                          <a:rPr lang="it-IT" b="0" i="1" smtClean="0">
+                            <a:latin typeface="Cambria Math" panose="02040503050406030204" pitchFamily="18" charset="0"/>
+                          </a:rPr>
+                          <m:t>𝑐</m:t>
+                        </m:r>
+                      </m:sub>
+                    </m:sSub>
+                    <m:r>
+                      <a:rPr lang="it-IT" b="0" i="1" smtClean="0">
+                        <a:latin typeface="Cambria Math" panose="02040503050406030204" pitchFamily="18" charset="0"/>
+                      </a:rPr>
+                      <m:t>≥ </m:t>
+                    </m:r>
+                    <m:f>
+                      <m:fPr>
+                        <m:ctrlPr>
+                          <a:rPr lang="it-IT" b="0" i="1" smtClean="0">
+                            <a:latin typeface="Cambria Math" panose="02040503050406030204" pitchFamily="18" charset="0"/>
+                          </a:rPr>
+                        </m:ctrlPr>
+                      </m:fPr>
+                      <m:num>
+                        <m:r>
+                          <a:rPr lang="it-IT" b="0" i="1" smtClean="0">
+                            <a:latin typeface="Cambria Math" panose="02040503050406030204" pitchFamily="18" charset="0"/>
+                          </a:rPr>
+                          <m:t>460</m:t>
+                        </m:r>
+                      </m:num>
+                      <m:den>
+                        <m:sSub>
+                          <m:sSubPr>
+                            <m:ctrlPr>
+                              <a:rPr lang="it-IT" b="0" i="1" smtClean="0">
+                                <a:latin typeface="Cambria Math" panose="02040503050406030204" pitchFamily="18" charset="0"/>
+                              </a:rPr>
+                            </m:ctrlPr>
+                          </m:sSubPr>
+                          <m:e>
+                            <m:r>
+                              <a:rPr lang="it-IT" b="0" i="1" smtClean="0">
+                                <a:latin typeface="Cambria Math" panose="02040503050406030204" pitchFamily="18" charset="0"/>
+                              </a:rPr>
+                              <m:t>𝑀</m:t>
+                            </m:r>
+                          </m:e>
+                          <m:sub>
+                            <m:r>
+                              <a:rPr lang="it-IT" b="0" i="1" smtClean="0">
+                                <a:latin typeface="Cambria Math" panose="02040503050406030204" pitchFamily="18" charset="0"/>
+                              </a:rPr>
+                              <m:t>𝑓</m:t>
+                            </m:r>
+                          </m:sub>
+                        </m:sSub>
+                        <m:r>
+                          <a:rPr lang="it-IT" b="0" i="1" smtClean="0">
+                            <a:latin typeface="Cambria Math" panose="02040503050406030204" pitchFamily="18" charset="0"/>
+                            <a:ea typeface="Cambria Math" panose="02040503050406030204" pitchFamily="18" charset="0"/>
+                          </a:rPr>
+                          <m:t>∙</m:t>
+                        </m:r>
+                        <m:sSub>
+                          <m:sSubPr>
+                            <m:ctrlPr>
+                              <a:rPr lang="it-IT" b="0" i="1" smtClean="0">
+                                <a:latin typeface="Cambria Math" panose="02040503050406030204" pitchFamily="18" charset="0"/>
+                                <a:ea typeface="Cambria Math" panose="02040503050406030204" pitchFamily="18" charset="0"/>
+                              </a:rPr>
+                            </m:ctrlPr>
+                          </m:sSubPr>
+                          <m:e>
+                            <m:r>
+                              <a:rPr lang="it-IT" b="0" i="1" smtClean="0">
+                                <a:latin typeface="Cambria Math" panose="02040503050406030204" pitchFamily="18" charset="0"/>
+                                <a:ea typeface="Cambria Math" panose="02040503050406030204" pitchFamily="18" charset="0"/>
+                              </a:rPr>
+                              <m:t>𝑇</m:t>
+                            </m:r>
+                          </m:e>
+                          <m:sub>
+                            <m:r>
+                              <a:rPr lang="it-IT" b="0" i="1" smtClean="0">
+                                <a:latin typeface="Cambria Math" panose="02040503050406030204" pitchFamily="18" charset="0"/>
+                                <a:ea typeface="Cambria Math" panose="02040503050406030204" pitchFamily="18" charset="0"/>
+                              </a:rPr>
+                              <m:t>𝑎</m:t>
+                            </m:r>
+                          </m:sub>
+                        </m:sSub>
+                      </m:den>
+                    </m:f>
+                    <m:r>
+                      <a:rPr lang="it-IT" b="0" i="1" smtClean="0">
+                        <a:latin typeface="Cambria Math" panose="02040503050406030204" pitchFamily="18" charset="0"/>
+                      </a:rPr>
+                      <m:t>=</m:t>
+                    </m:r>
+                    <m:f>
+                      <m:fPr>
+                        <m:ctrlPr>
+                          <a:rPr lang="it-IT" b="0" i="1" smtClean="0">
+                            <a:latin typeface="Cambria Math" panose="02040503050406030204" pitchFamily="18" charset="0"/>
+                          </a:rPr>
+                        </m:ctrlPr>
+                      </m:fPr>
+                      <m:num>
+                        <m:r>
+                          <a:rPr lang="it-IT" b="0" i="1" smtClean="0">
+                            <a:latin typeface="Cambria Math" panose="02040503050406030204" pitchFamily="18" charset="0"/>
+                          </a:rPr>
+                          <m:t>460</m:t>
+                        </m:r>
+                      </m:num>
+                      <m:den>
+                        <m:r>
+                          <a:rPr lang="it-IT" b="0" i="1" smtClean="0">
+                            <a:latin typeface="Cambria Math" panose="02040503050406030204" pitchFamily="18" charset="0"/>
+                          </a:rPr>
+                          <m:t>54</m:t>
+                        </m:r>
+                        <m:r>
+                          <a:rPr lang="it-IT" b="0" i="1" smtClean="0">
+                            <a:latin typeface="Cambria Math" panose="02040503050406030204" pitchFamily="18" charset="0"/>
+                            <a:ea typeface="Cambria Math" panose="02040503050406030204" pitchFamily="18" charset="0"/>
+                          </a:rPr>
+                          <m:t>∙0,3</m:t>
+                        </m:r>
+                      </m:den>
+                    </m:f>
+                    <m:r>
+                      <a:rPr lang="it-IT" b="0" i="1" smtClean="0">
+                        <a:latin typeface="Cambria Math" panose="02040503050406030204" pitchFamily="18" charset="0"/>
+                      </a:rPr>
+                      <m:t>=28,395 </m:t>
+                    </m:r>
+                    <m:r>
+                      <a:rPr lang="it-IT" b="0" i="1" smtClean="0">
+                        <a:latin typeface="Cambria Math" panose="02040503050406030204" pitchFamily="18" charset="0"/>
+                        <a:ea typeface="Cambria Math" panose="02040503050406030204" pitchFamily="18" charset="0"/>
+                      </a:rPr>
+                      <m:t>≅29;</m:t>
+                    </m:r>
+                  </m:oMath>
+                </a14:m>
+                <a:br>
+                  <a:rPr lang="it-IT" dirty="0"/>
+                </a:br>
+                <a:endParaRPr lang="it-IT" dirty="0"/>
+              </a:p>
+            </p:txBody>
+          </p:sp>
+        </mc:Choice>
+        <mc:Fallback>
+          <p:sp>
+            <p:nvSpPr>
+              <p:cNvPr id="2" name="Titolo 1">
+                <a:extLst>
+                  <a:ext uri="{FF2B5EF4-FFF2-40B4-BE49-F238E27FC236}">
+                    <a16:creationId xmlns:a16="http://schemas.microsoft.com/office/drawing/2014/main" id="{1664688C-F760-447B-9170-256507121AE8}"/>
+                  </a:ext>
+                </a:extLst>
+              </p:cNvPr>
+              <p:cNvSpPr>
+                <a:spLocks noGrp="1" noRot="1" noChangeAspect="1" noMove="1" noResize="1" noEditPoints="1" noAdjustHandles="1" noChangeArrowheads="1" noChangeShapeType="1" noTextEdit="1"/>
+              </p:cNvSpPr>
+              <p:nvPr>
+                <p:ph type="title"/>
+              </p:nvPr>
+            </p:nvSpPr>
+            <p:spPr>
+              <a:xfrm>
+                <a:off x="838200" y="365125"/>
+                <a:ext cx="10515600" cy="6159962"/>
+              </a:xfrm>
+              <a:blipFill>
+                <a:blip r:embed="rId2"/>
+                <a:stretch>
+                  <a:fillRect l="-2377" r="-1681"/>
+                </a:stretch>
+              </a:blipFill>
+            </p:spPr>
+            <p:txBody>
+              <a:bodyPr/>
+              <a:lstStyle/>
+              <a:p>
+                <a:r>
+                  <a:rPr lang="it-IT">
+                    <a:noFill/>
+                  </a:rPr>
+                  <a:t> </a:t>
+                </a:r>
+              </a:p>
+            </p:txBody>
+          </p:sp>
+        </mc:Fallback>
+      </mc:AlternateContent>
+    </p:spTree>
+    <p:extLst>
+      <p:ext uri="{BB962C8B-B14F-4D97-AF65-F5344CB8AC3E}">
+        <p14:creationId xmlns:p14="http://schemas.microsoft.com/office/powerpoint/2010/main" val="3062591766"/>
+      </p:ext>
+    </p:extLst>
+  </p:cSld>
+  <p:clrMapOvr>
+    <a:masterClrMapping/>
+  </p:clrMapOvr>
+</p:sld>
+</file>
+
+<file path=ppt/slides/slide11.xml><?xml version="1.0" encoding="utf-8"?>
+<p:sld xmlns:a="http://schemas.openxmlformats.org/drawingml/2006/main" xmlns:r="http://schemas.openxmlformats.org/officeDocument/2006/relationships" xmlns:p="http://schemas.openxmlformats.org/presentationml/2006/main">
+  <p:cSld>
+    <p:spTree>
+      <p:nvGrpSpPr>
+        <p:cNvPr id="1" name=""/>
+        <p:cNvGrpSpPr/>
+        <p:nvPr/>
+      </p:nvGrpSpPr>
+      <p:grpSpPr>
+        <a:xfrm>
+          <a:off x="0" y="0"/>
+          <a:ext cx="0" cy="0"/>
+          <a:chOff x="0" y="0"/>
+          <a:chExt cx="0" cy="0"/>
+        </a:xfrm>
+      </p:grpSpPr>
+      <p:sp>
+        <p:nvSpPr>
+          <p:cNvPr id="2" name="Titolo 1">
+            <a:extLst>
+              <a:ext uri="{FF2B5EF4-FFF2-40B4-BE49-F238E27FC236}">
+                <a16:creationId xmlns:a16="http://schemas.microsoft.com/office/drawing/2014/main" id="{F337904D-DF8E-425D-BF9A-82EC55A706EA}"/>
+              </a:ext>
+            </a:extLst>
+          </p:cNvPr>
+          <p:cNvSpPr>
+            <a:spLocks noGrp="1"/>
+          </p:cNvSpPr>
+          <p:nvPr>
+            <p:ph type="title"/>
+          </p:nvPr>
+        </p:nvSpPr>
+        <p:spPr>
+          <a:xfrm>
+            <a:off x="838200" y="365125"/>
+            <a:ext cx="10515600" cy="6492875"/>
+          </a:xfrm>
+        </p:spPr>
+        <p:txBody>
+          <a:bodyPr/>
+          <a:lstStyle/>
+          <a:p>
+            <a:r>
+              <a:rPr lang="it-IT" dirty="0"/>
+              <a:t>Vincolo 5……..??????</a:t>
+            </a:r>
+            <a:br>
+              <a:rPr lang="it-IT" dirty="0"/>
+            </a:br>
+            <a:r>
+              <a:rPr lang="it-IT" dirty="0"/>
+              <a:t>Ancora non ho capito cosa </a:t>
+            </a:r>
+            <a:r>
+              <a:rPr lang="it-IT"/>
+              <a:t>fare </a:t>
+            </a:r>
+            <a:r>
+              <a:rPr lang="it-IT">
+                <a:sym typeface="Wingdings" panose="05000000000000000000" pitchFamily="2" charset="2"/>
+              </a:rPr>
+              <a:t></a:t>
+            </a:r>
+            <a:br>
+              <a:rPr lang="it-IT">
+                <a:sym typeface="Wingdings" panose="05000000000000000000" pitchFamily="2" charset="2"/>
+              </a:rPr>
+            </a:br>
+            <a:br>
+              <a:rPr lang="it-IT">
+                <a:sym typeface="Wingdings" panose="05000000000000000000" pitchFamily="2" charset="2"/>
+              </a:rPr>
+            </a:br>
+            <a:br>
+              <a:rPr lang="it-IT">
+                <a:sym typeface="Wingdings" panose="05000000000000000000" pitchFamily="2" charset="2"/>
+              </a:rPr>
+            </a:br>
+            <a:br>
+              <a:rPr lang="it-IT">
+                <a:sym typeface="Wingdings" panose="05000000000000000000" pitchFamily="2" charset="2"/>
+              </a:rPr>
+            </a:br>
+            <a:br>
+              <a:rPr lang="it-IT">
+                <a:sym typeface="Wingdings" panose="05000000000000000000" pitchFamily="2" charset="2"/>
+              </a:rPr>
+            </a:br>
+            <a:r>
+              <a:rPr lang="it-IT">
+                <a:sym typeface="Wingdings" panose="05000000000000000000" pitchFamily="2" charset="2"/>
+              </a:rPr>
+              <a:t>WORK IN PROGRESS</a:t>
+            </a:r>
+            <a:br>
+              <a:rPr lang="it-IT" dirty="0">
+                <a:sym typeface="Wingdings" panose="05000000000000000000" pitchFamily="2" charset="2"/>
+              </a:rPr>
+            </a:br>
+            <a:endParaRPr lang="it-IT" dirty="0"/>
+          </a:p>
+        </p:txBody>
+      </p:sp>
+    </p:spTree>
+    <p:extLst>
+      <p:ext uri="{BB962C8B-B14F-4D97-AF65-F5344CB8AC3E}">
+        <p14:creationId xmlns:p14="http://schemas.microsoft.com/office/powerpoint/2010/main" val="3502856723"/>
       </p:ext>
     </p:extLst>
   </p:cSld>
@@ -5496,8 +6011,8 @@
           </a:graphicData>
         </a:graphic>
       </p:graphicFrame>
-      <mc:AlternateContent xmlns:mc="http://schemas.openxmlformats.org/markup-compatibility/2006">
-        <mc:Choice xmlns:a14="http://schemas.microsoft.com/office/drawing/2010/main" Requires="a14">
+      <mc:AlternateContent xmlns:mc="http://schemas.openxmlformats.org/markup-compatibility/2006" xmlns:a14="http://schemas.microsoft.com/office/drawing/2010/main">
+        <mc:Choice Requires="a14">
           <p:graphicFrame>
             <p:nvGraphicFramePr>
               <p:cNvPr id="14" name="Tabella 14">
@@ -6788,7 +7303,7 @@
             </a:graphic>
           </p:graphicFrame>
         </mc:Choice>
-        <mc:Fallback>
+        <mc:Fallback xmlns="">
           <p:graphicFrame>
             <p:nvGraphicFramePr>
               <p:cNvPr id="14" name="Tabella 14">
@@ -7362,8 +7877,8 @@
           </a:p>
         </p:txBody>
       </p:sp>
-      <mc:AlternateContent xmlns:mc="http://schemas.openxmlformats.org/markup-compatibility/2006">
-        <mc:Choice xmlns:a14="http://schemas.microsoft.com/office/drawing/2010/main" Requires="a14">
+      <mc:AlternateContent xmlns:mc="http://schemas.openxmlformats.org/markup-compatibility/2006" xmlns:a14="http://schemas.microsoft.com/office/drawing/2010/main">
+        <mc:Choice Requires="a14">
           <p:sp>
             <p:nvSpPr>
               <p:cNvPr id="8" name="CasellaDiTesto 7">
@@ -7445,7 +7960,7 @@
             </p:txBody>
           </p:sp>
         </mc:Choice>
-        <mc:Fallback>
+        <mc:Fallback xmlns="">
           <p:sp>
             <p:nvSpPr>
               <p:cNvPr id="8" name="CasellaDiTesto 7">
@@ -7859,8 +8374,8 @@
           </a:p>
         </p:txBody>
       </p:sp>
-      <mc:AlternateContent xmlns:mc="http://schemas.openxmlformats.org/markup-compatibility/2006">
-        <mc:Choice xmlns:a14="http://schemas.microsoft.com/office/drawing/2010/main" Requires="a14">
+      <mc:AlternateContent xmlns:mc="http://schemas.openxmlformats.org/markup-compatibility/2006" xmlns:a14="http://schemas.microsoft.com/office/drawing/2010/main">
+        <mc:Choice Requires="a14">
           <p:sp>
             <p:nvSpPr>
               <p:cNvPr id="6" name="CasellaDiTesto 5">
@@ -7982,7 +8497,7 @@
             </p:txBody>
           </p:sp>
         </mc:Choice>
-        <mc:Fallback>
+        <mc:Fallback xmlns="">
           <p:sp>
             <p:nvSpPr>
               <p:cNvPr id="6" name="CasellaDiTesto 5">
@@ -8124,8 +8639,8 @@
           </a:p>
         </p:txBody>
       </p:sp>
-      <mc:AlternateContent xmlns:mc="http://schemas.openxmlformats.org/markup-compatibility/2006">
-        <mc:Choice xmlns:a14="http://schemas.microsoft.com/office/drawing/2010/main" Requires="a14">
+      <mc:AlternateContent xmlns:mc="http://schemas.openxmlformats.org/markup-compatibility/2006" xmlns:a14="http://schemas.microsoft.com/office/drawing/2010/main">
+        <mc:Choice Requires="a14">
           <p:sp>
             <p:nvSpPr>
               <p:cNvPr id="9" name="CasellaDiTesto 8">
@@ -8176,7 +8691,7 @@
                           <a:rPr lang="it-IT" b="0" i="0" smtClean="0">
                             <a:latin typeface="Cambria Math" panose="02040503050406030204" pitchFamily="18" charset="0"/>
                           </a:rPr>
-                          <m:t>-</m:t>
+                          <m:t>−</m:t>
                         </m:r>
                         <m:r>
                           <m:rPr>
@@ -8192,7 +8707,7 @@
                             <m:nor/>
                           </m:rPr>
                           <a:rPr lang="it-IT" dirty="0"/>
-                          <m:t>(-3,69 – 4</m:t>
+                          <m:t>(−3,69 – 4</m:t>
                         </m:r>
                         <m:sSup>
                           <m:sSupPr>
@@ -8329,7 +8844,7 @@
             </p:txBody>
           </p:sp>
         </mc:Choice>
-        <mc:Fallback>
+        <mc:Fallback xmlns="">
           <p:sp>
             <p:nvSpPr>
               <p:cNvPr id="9" name="CasellaDiTesto 8">
@@ -8408,6 +8923,1548 @@
     <p:extLst>
       <p:ext uri="{BB962C8B-B14F-4D97-AF65-F5344CB8AC3E}">
         <p14:creationId xmlns:p14="http://schemas.microsoft.com/office/powerpoint/2010/main" val="236742093"/>
+      </p:ext>
+    </p:extLst>
+  </p:cSld>
+  <p:clrMapOvr>
+    <a:masterClrMapping/>
+  </p:clrMapOvr>
+</p:sld>
+</file>
+
+<file path=ppt/slides/slide6.xml><?xml version="1.0" encoding="utf-8"?>
+<p:sld xmlns:a="http://schemas.openxmlformats.org/drawingml/2006/main" xmlns:r="http://schemas.openxmlformats.org/officeDocument/2006/relationships" xmlns:p="http://schemas.openxmlformats.org/presentationml/2006/main">
+  <p:cSld>
+    <p:spTree>
+      <p:nvGrpSpPr>
+        <p:cNvPr id="1" name=""/>
+        <p:cNvGrpSpPr/>
+        <p:nvPr/>
+      </p:nvGrpSpPr>
+      <p:grpSpPr>
+        <a:xfrm>
+          <a:off x="0" y="0"/>
+          <a:ext cx="0" cy="0"/>
+          <a:chOff x="0" y="0"/>
+          <a:chExt cx="0" cy="0"/>
+        </a:xfrm>
+      </p:grpSpPr>
+      <p:sp>
+        <p:nvSpPr>
+          <p:cNvPr id="2" name="Titolo 1">
+            <a:extLst>
+              <a:ext uri="{FF2B5EF4-FFF2-40B4-BE49-F238E27FC236}">
+                <a16:creationId xmlns:a16="http://schemas.microsoft.com/office/drawing/2014/main" id="{5F87852B-4861-4D25-9F15-4C8886DC9155}"/>
+              </a:ext>
+            </a:extLst>
+          </p:cNvPr>
+          <p:cNvSpPr>
+            <a:spLocks noGrp="1"/>
+          </p:cNvSpPr>
+          <p:nvPr>
+            <p:ph type="title"/>
+          </p:nvPr>
+        </p:nvSpPr>
+        <p:spPr/>
+        <p:txBody>
+          <a:bodyPr/>
+          <a:lstStyle/>
+          <a:p>
+            <a:r>
+              <a:rPr lang="it-IT" dirty="0"/>
+              <a:t>PASSO 3</a:t>
+            </a:r>
+          </a:p>
+        </p:txBody>
+      </p:sp>
+      <mc:AlternateContent xmlns:mc="http://schemas.openxmlformats.org/markup-compatibility/2006">
+        <mc:Choice xmlns:a14="http://schemas.microsoft.com/office/drawing/2010/main" Requires="a14">
+          <p:sp>
+            <p:nvSpPr>
+              <p:cNvPr id="3" name="CasellaDiTesto 2">
+                <a:extLst>
+                  <a:ext uri="{FF2B5EF4-FFF2-40B4-BE49-F238E27FC236}">
+                    <a16:creationId xmlns:a16="http://schemas.microsoft.com/office/drawing/2014/main" id="{C81E2063-CC75-416D-9AEC-C8ED01F1A8E0}"/>
+                  </a:ext>
+                </a:extLst>
+              </p:cNvPr>
+              <p:cNvSpPr txBox="1"/>
+              <p:nvPr/>
+            </p:nvSpPr>
+            <p:spPr>
+              <a:xfrm>
+                <a:off x="595745" y="1953491"/>
+                <a:ext cx="10287047" cy="3173754"/>
+              </a:xfrm>
+              <a:prstGeom prst="rect">
+                <a:avLst/>
+              </a:prstGeom>
+              <a:noFill/>
+            </p:spPr>
+            <p:txBody>
+              <a:bodyPr wrap="none" rtlCol="0">
+                <a:spAutoFit/>
+              </a:bodyPr>
+              <a:lstStyle/>
+              <a:p>
+                <a:r>
+                  <a:rPr lang="it-IT" dirty="0"/>
+                  <a:t>Specifiche da rispettare :</a:t>
+                </a:r>
+              </a:p>
+              <a:p>
+                <a:pPr marL="285750" indent="-285750">
+                  <a:buFont typeface="Arial" panose="020B0604020202020204" pitchFamily="34" charset="0"/>
+                  <a:buChar char="•"/>
+                </a:pPr>
+                <a:r>
+                  <a:rPr lang="it-IT" dirty="0"/>
+                  <a:t>Errore a regime nullo con riferimento a gradino  -&gt; </a:t>
+                </a:r>
+                <a:r>
+                  <a:rPr lang="it-IT" dirty="0">
+                    <a:sym typeface="Wingdings" panose="05000000000000000000" pitchFamily="2" charset="2"/>
+                  </a:rPr>
+                  <a:t> necessario un polo nell’origine in L(s) = R(s)G(s)</a:t>
+                </a:r>
+              </a:p>
+              <a:p>
+                <a:pPr lvl="8"/>
+                <a:r>
+                  <a:rPr lang="it-IT" dirty="0">
+                    <a:sym typeface="Wingdings" panose="05000000000000000000" pitchFamily="2" charset="2"/>
+                  </a:rPr>
+                  <a:t>		tale polo deve essere introdotto quindi nella R(s)</a:t>
+                </a:r>
+                <a:endParaRPr lang="it-IT" dirty="0"/>
+              </a:p>
+              <a:p>
+                <a:pPr marL="285750" indent="-285750">
+                  <a:buFont typeface="Arial" panose="020B0604020202020204" pitchFamily="34" charset="0"/>
+                  <a:buChar char="•"/>
+                </a:pPr>
+                <a14:m>
+                  <m:oMath xmlns:m="http://schemas.openxmlformats.org/officeDocument/2006/math">
+                    <m:sSub>
+                      <m:sSubPr>
+                        <m:ctrlPr>
+                          <a:rPr lang="it-IT" i="1" smtClean="0">
+                            <a:latin typeface="Cambria Math" panose="02040503050406030204" pitchFamily="18" charset="0"/>
+                          </a:rPr>
+                        </m:ctrlPr>
+                      </m:sSubPr>
+                      <m:e>
+                        <m:r>
+                          <a:rPr lang="it-IT" b="0" i="1" smtClean="0">
+                            <a:latin typeface="Cambria Math" panose="02040503050406030204" pitchFamily="18" charset="0"/>
+                          </a:rPr>
+                          <m:t>𝑀</m:t>
+                        </m:r>
+                      </m:e>
+                      <m:sub>
+                        <m:r>
+                          <a:rPr lang="it-IT" b="0" i="1" smtClean="0">
+                            <a:latin typeface="Cambria Math" panose="02040503050406030204" pitchFamily="18" charset="0"/>
+                          </a:rPr>
+                          <m:t>𝑓</m:t>
+                        </m:r>
+                      </m:sub>
+                    </m:sSub>
+                    <m:r>
+                      <a:rPr lang="it-IT" b="0" i="1" smtClean="0">
+                        <a:latin typeface="Cambria Math" panose="02040503050406030204" pitchFamily="18" charset="0"/>
+                      </a:rPr>
+                      <m:t>≥45</m:t>
+                    </m:r>
+                  </m:oMath>
+                </a14:m>
+                <a:endParaRPr lang="it-IT" dirty="0"/>
+              </a:p>
+              <a:p>
+                <a:pPr marL="285750" indent="-285750">
+                  <a:buFont typeface="Arial" panose="020B0604020202020204" pitchFamily="34" charset="0"/>
+                  <a:buChar char="•"/>
+                </a:pPr>
+                <a14:m>
+                  <m:oMath xmlns:m="http://schemas.openxmlformats.org/officeDocument/2006/math">
+                    <m:r>
+                      <a:rPr lang="it-IT" b="0" i="1" smtClean="0">
+                        <a:latin typeface="Cambria Math" panose="02040503050406030204" pitchFamily="18" charset="0"/>
+                      </a:rPr>
+                      <m:t>𝑆</m:t>
+                    </m:r>
+                    <m:r>
+                      <a:rPr lang="it-IT" b="0" i="1" smtClean="0">
+                        <a:latin typeface="Cambria Math" panose="02040503050406030204" pitchFamily="18" charset="0"/>
+                      </a:rPr>
+                      <m:t>%&lt;1 </m:t>
+                    </m:r>
+                  </m:oMath>
+                </a14:m>
+                <a:endParaRPr lang="it-IT" dirty="0"/>
+              </a:p>
+              <a:p>
+                <a:pPr marL="285750" indent="-285750">
+                  <a:buFont typeface="Arial" panose="020B0604020202020204" pitchFamily="34" charset="0"/>
+                  <a:buChar char="•"/>
+                </a:pPr>
+                <a14:m>
+                  <m:oMath xmlns:m="http://schemas.openxmlformats.org/officeDocument/2006/math">
+                    <m:sSub>
+                      <m:sSubPr>
+                        <m:ctrlPr>
+                          <a:rPr lang="it-IT" i="1" smtClean="0">
+                            <a:latin typeface="Cambria Math" panose="02040503050406030204" pitchFamily="18" charset="0"/>
+                          </a:rPr>
+                        </m:ctrlPr>
+                      </m:sSubPr>
+                      <m:e>
+                        <m:r>
+                          <a:rPr lang="it-IT" b="0" i="1" smtClean="0">
+                            <a:latin typeface="Cambria Math" panose="02040503050406030204" pitchFamily="18" charset="0"/>
+                          </a:rPr>
+                          <m:t>𝑇</m:t>
+                        </m:r>
+                      </m:e>
+                      <m:sub>
+                        <m:r>
+                          <a:rPr lang="it-IT" b="0" i="1" smtClean="0">
+                            <a:latin typeface="Cambria Math" panose="02040503050406030204" pitchFamily="18" charset="0"/>
+                          </a:rPr>
+                          <m:t>𝑎</m:t>
+                        </m:r>
+                      </m:sub>
+                    </m:sSub>
+                    <m:d>
+                      <m:dPr>
+                        <m:begChr m:val="["/>
+                        <m:endChr m:val="]"/>
+                        <m:ctrlPr>
+                          <a:rPr lang="it-IT" b="0" i="1" smtClean="0">
+                            <a:latin typeface="Cambria Math" panose="02040503050406030204" pitchFamily="18" charset="0"/>
+                          </a:rPr>
+                        </m:ctrlPr>
+                      </m:dPr>
+                      <m:e>
+                        <m:r>
+                          <a:rPr lang="it-IT" b="0" i="1" smtClean="0">
+                            <a:latin typeface="Cambria Math" panose="02040503050406030204" pitchFamily="18" charset="0"/>
+                          </a:rPr>
+                          <m:t>𝑠</m:t>
+                        </m:r>
+                      </m:e>
+                    </m:d>
+                    <m:r>
+                      <a:rPr lang="it-IT" b="0" i="1" smtClean="0">
+                        <a:latin typeface="Cambria Math" panose="02040503050406030204" pitchFamily="18" charset="0"/>
+                      </a:rPr>
+                      <m:t> &lt; </m:t>
+                    </m:r>
+                    <m:sSub>
+                      <m:sSubPr>
+                        <m:ctrlPr>
+                          <a:rPr lang="it-IT" i="1" smtClean="0">
+                            <a:latin typeface="Cambria Math" panose="02040503050406030204" pitchFamily="18" charset="0"/>
+                          </a:rPr>
+                        </m:ctrlPr>
+                      </m:sSubPr>
+                      <m:e>
+                        <m:r>
+                          <a:rPr lang="it-IT" b="0" i="1" smtClean="0">
+                            <a:latin typeface="Cambria Math" panose="02040503050406030204" pitchFamily="18" charset="0"/>
+                          </a:rPr>
+                          <m:t>𝑇</m:t>
+                        </m:r>
+                      </m:e>
+                      <m:sub>
+                        <m:r>
+                          <a:rPr lang="it-IT" b="0" i="1" smtClean="0">
+                            <a:latin typeface="Cambria Math" panose="02040503050406030204" pitchFamily="18" charset="0"/>
+                          </a:rPr>
+                          <m:t>𝑎</m:t>
+                        </m:r>
+                        <m:r>
+                          <a:rPr lang="it-IT" b="0" i="1" smtClean="0">
+                            <a:latin typeface="Cambria Math" panose="02040503050406030204" pitchFamily="18" charset="0"/>
+                          </a:rPr>
+                          <m:t>,1</m:t>
+                        </m:r>
+                      </m:sub>
+                    </m:sSub>
+                    <m:r>
+                      <a:rPr lang="it-IT" b="0" i="1" smtClean="0">
+                        <a:latin typeface="Cambria Math" panose="02040503050406030204" pitchFamily="18" charset="0"/>
+                      </a:rPr>
+                      <m:t>=0,3</m:t>
+                    </m:r>
+                  </m:oMath>
+                </a14:m>
+                <a:endParaRPr lang="it-IT" b="0" i="1" dirty="0">
+                  <a:latin typeface="Cambria Math" panose="02040503050406030204" pitchFamily="18" charset="0"/>
+                </a:endParaRPr>
+              </a:p>
+              <a:p>
+                <a:pPr marL="285750" indent="-285750">
+                  <a:buFont typeface="Arial" panose="020B0604020202020204" pitchFamily="34" charset="0"/>
+                  <a:buChar char="•"/>
+                </a:pPr>
+                <a:r>
+                  <a:rPr lang="it-IT" b="0" dirty="0"/>
+                  <a:t>Vedere cosa succede se </a:t>
+                </a:r>
+                <a:r>
+                  <a:rPr lang="it-IT" b="0" dirty="0" err="1"/>
+                  <a:t>Fv</a:t>
+                </a:r>
+                <a:r>
+                  <a:rPr lang="it-IT" b="0" dirty="0"/>
+                  <a:t> = </a:t>
+                </a:r>
+                <a:r>
+                  <a:rPr lang="it-IT" b="0" dirty="0" err="1"/>
+                  <a:t>Fv</a:t>
+                </a:r>
+                <a:r>
+                  <a:rPr lang="it-IT" b="0" dirty="0"/>
+                  <a:t> +1   e quando </a:t>
+                </a:r>
+                <a:r>
+                  <a:rPr lang="it-IT" b="0" dirty="0" err="1"/>
+                  <a:t>Fv</a:t>
+                </a:r>
+                <a:r>
+                  <a:rPr lang="it-IT" b="0" dirty="0"/>
+                  <a:t>= Fv-1   </a:t>
+                </a:r>
+              </a:p>
+              <a:p>
+                <a:r>
+                  <a:rPr lang="it-IT" dirty="0"/>
+                  <a:t>                     /\</a:t>
+                </a:r>
+              </a:p>
+              <a:p>
+                <a:r>
+                  <a:rPr lang="it-IT" dirty="0"/>
+                  <a:t>	    | </a:t>
+                </a:r>
+              </a:p>
+              <a:p>
+                <a:r>
+                  <a:rPr lang="it-IT" dirty="0"/>
+                  <a:t>	    |</a:t>
+                </a:r>
+              </a:p>
+              <a:p>
+                <a:pPr marL="285750" indent="-285750">
+                  <a:buFont typeface="Arial" panose="020B0604020202020204" pitchFamily="34" charset="0"/>
+                  <a:buChar char="•"/>
+                </a:pPr>
+                <a:r>
+                  <a:rPr lang="it-IT" b="0" dirty="0"/>
+                  <a:t>Rifare regolatore in caso qualcosa non è a posto        </a:t>
+                </a:r>
+                <a14:m>
+                  <m:oMath xmlns:m="http://schemas.openxmlformats.org/officeDocument/2006/math">
+                    <m:r>
+                      <a:rPr lang="it-IT" b="0" i="1" smtClean="0">
+                        <a:latin typeface="Cambria Math" panose="02040503050406030204" pitchFamily="18" charset="0"/>
+                      </a:rPr>
+                      <m:t> </m:t>
+                    </m:r>
+                  </m:oMath>
+                </a14:m>
+                <a:endParaRPr lang="it-IT" dirty="0"/>
+              </a:p>
+            </p:txBody>
+          </p:sp>
+        </mc:Choice>
+        <mc:Fallback>
+          <p:sp>
+            <p:nvSpPr>
+              <p:cNvPr id="3" name="CasellaDiTesto 2">
+                <a:extLst>
+                  <a:ext uri="{FF2B5EF4-FFF2-40B4-BE49-F238E27FC236}">
+                    <a16:creationId xmlns:a16="http://schemas.microsoft.com/office/drawing/2014/main" id="{C81E2063-CC75-416D-9AEC-C8ED01F1A8E0}"/>
+                  </a:ext>
+                </a:extLst>
+              </p:cNvPr>
+              <p:cNvSpPr txBox="1">
+                <a:spLocks noRot="1" noChangeAspect="1" noMove="1" noResize="1" noEditPoints="1" noAdjustHandles="1" noChangeArrowheads="1" noChangeShapeType="1" noTextEdit="1"/>
+              </p:cNvSpPr>
+              <p:nvPr/>
+            </p:nvSpPr>
+            <p:spPr>
+              <a:xfrm>
+                <a:off x="595745" y="1953491"/>
+                <a:ext cx="10287047" cy="3173754"/>
+              </a:xfrm>
+              <a:prstGeom prst="rect">
+                <a:avLst/>
+              </a:prstGeom>
+              <a:blipFill>
+                <a:blip r:embed="rId2"/>
+                <a:stretch>
+                  <a:fillRect l="-533" t="-960" b="-2111"/>
+                </a:stretch>
+              </a:blipFill>
+            </p:spPr>
+            <p:txBody>
+              <a:bodyPr/>
+              <a:lstStyle/>
+              <a:p>
+                <a:r>
+                  <a:rPr lang="it-IT">
+                    <a:noFill/>
+                  </a:rPr>
+                  <a:t> </a:t>
+                </a:r>
+              </a:p>
+            </p:txBody>
+          </p:sp>
+        </mc:Fallback>
+      </mc:AlternateContent>
+    </p:spTree>
+    <p:extLst>
+      <p:ext uri="{BB962C8B-B14F-4D97-AF65-F5344CB8AC3E}">
+        <p14:creationId xmlns:p14="http://schemas.microsoft.com/office/powerpoint/2010/main" val="1724879757"/>
+      </p:ext>
+    </p:extLst>
+  </p:cSld>
+  <p:clrMapOvr>
+    <a:masterClrMapping/>
+  </p:clrMapOvr>
+</p:sld>
+</file>
+
+<file path=ppt/slides/slide7.xml><?xml version="1.0" encoding="utf-8"?>
+<p:sld xmlns:a="http://schemas.openxmlformats.org/drawingml/2006/main" xmlns:r="http://schemas.openxmlformats.org/officeDocument/2006/relationships" xmlns:p="http://schemas.openxmlformats.org/presentationml/2006/main">
+  <p:cSld>
+    <p:spTree>
+      <p:nvGrpSpPr>
+        <p:cNvPr id="1" name=""/>
+        <p:cNvGrpSpPr/>
+        <p:nvPr/>
+      </p:nvGrpSpPr>
+      <p:grpSpPr>
+        <a:xfrm>
+          <a:off x="0" y="0"/>
+          <a:ext cx="0" cy="0"/>
+          <a:chOff x="0" y="0"/>
+          <a:chExt cx="0" cy="0"/>
+        </a:xfrm>
+      </p:grpSpPr>
+      <mc:AlternateContent xmlns:mc="http://schemas.openxmlformats.org/markup-compatibility/2006">
+        <mc:Choice xmlns:a14="http://schemas.microsoft.com/office/drawing/2010/main" Requires="a14">
+          <p:sp>
+            <p:nvSpPr>
+              <p:cNvPr id="2" name="Titolo 1">
+                <a:extLst>
+                  <a:ext uri="{FF2B5EF4-FFF2-40B4-BE49-F238E27FC236}">
+                    <a16:creationId xmlns:a16="http://schemas.microsoft.com/office/drawing/2014/main" id="{3C52B988-3418-401B-8D1B-F6246FE6A373}"/>
+                  </a:ext>
+                </a:extLst>
+              </p:cNvPr>
+              <p:cNvSpPr>
+                <a:spLocks noGrp="1"/>
+              </p:cNvSpPr>
+              <p:nvPr>
+                <p:ph type="title"/>
+              </p:nvPr>
+            </p:nvSpPr>
+            <p:spPr>
+              <a:xfrm>
+                <a:off x="838200" y="365125"/>
+                <a:ext cx="10515600" cy="5746917"/>
+              </a:xfrm>
+            </p:spPr>
+            <p:txBody>
+              <a:bodyPr>
+                <a:normAutofit/>
+              </a:bodyPr>
+              <a:lstStyle/>
+              <a:p>
+                <a:r>
+                  <a:rPr lang="it-IT" dirty="0"/>
+                  <a:t>Vincolo 1</a:t>
+                </a:r>
+                <a:br>
+                  <a:rPr lang="it-IT" dirty="0"/>
+                </a:br>
+                <a:r>
+                  <a:rPr lang="it-IT" dirty="0"/>
+                  <a:t>per soddisfare il primo vincolo sul </a:t>
+                </a:r>
+                <a14:m>
+                  <m:oMath xmlns:m="http://schemas.openxmlformats.org/officeDocument/2006/math">
+                    <m:func>
+                      <m:funcPr>
+                        <m:ctrlPr>
+                          <a:rPr lang="it-IT" i="1" smtClean="0">
+                            <a:latin typeface="Cambria Math" panose="02040503050406030204" pitchFamily="18" charset="0"/>
+                          </a:rPr>
+                        </m:ctrlPr>
+                      </m:funcPr>
+                      <m:fName>
+                        <m:limLow>
+                          <m:limLowPr>
+                            <m:ctrlPr>
+                              <a:rPr lang="it-IT" i="1" smtClean="0">
+                                <a:latin typeface="Cambria Math" panose="02040503050406030204" pitchFamily="18" charset="0"/>
+                              </a:rPr>
+                            </m:ctrlPr>
+                          </m:limLowPr>
+                          <m:e>
+                            <m:r>
+                              <m:rPr>
+                                <m:sty m:val="p"/>
+                              </m:rPr>
+                              <a:rPr lang="it-IT" i="0" smtClean="0">
+                                <a:latin typeface="Cambria Math" panose="02040503050406030204" pitchFamily="18" charset="0"/>
+                              </a:rPr>
+                              <m:t>lim</m:t>
+                            </m:r>
+                          </m:e>
+                          <m:lim>
+                            <m:r>
+                              <a:rPr lang="it-IT" b="0" i="1" smtClean="0">
+                                <a:latin typeface="Cambria Math" panose="02040503050406030204" pitchFamily="18" charset="0"/>
+                              </a:rPr>
+                              <m:t>𝑡</m:t>
+                            </m:r>
+                            <m:r>
+                              <a:rPr lang="it-IT" b="0" i="1" smtClean="0">
+                                <a:latin typeface="Cambria Math" panose="02040503050406030204" pitchFamily="18" charset="0"/>
+                              </a:rPr>
+                              <m:t>→∞</m:t>
+                            </m:r>
+                          </m:lim>
+                        </m:limLow>
+                      </m:fName>
+                      <m:e>
+                        <m:r>
+                          <a:rPr lang="it-IT" b="0" i="1" smtClean="0">
+                            <a:latin typeface="Cambria Math" panose="02040503050406030204" pitchFamily="18" charset="0"/>
+                          </a:rPr>
+                          <m:t>𝑒</m:t>
+                        </m:r>
+                        <m:d>
+                          <m:dPr>
+                            <m:ctrlPr>
+                              <a:rPr lang="it-IT" b="0" i="1" smtClean="0">
+                                <a:latin typeface="Cambria Math" panose="02040503050406030204" pitchFamily="18" charset="0"/>
+                              </a:rPr>
+                            </m:ctrlPr>
+                          </m:dPr>
+                          <m:e>
+                            <m:r>
+                              <a:rPr lang="it-IT" b="0" i="1" smtClean="0">
+                                <a:latin typeface="Cambria Math" panose="02040503050406030204" pitchFamily="18" charset="0"/>
+                              </a:rPr>
+                              <m:t>𝑡</m:t>
+                            </m:r>
+                          </m:e>
+                        </m:d>
+                        <m:r>
+                          <a:rPr lang="it-IT" b="0" i="1" smtClean="0">
+                            <a:latin typeface="Cambria Math" panose="02040503050406030204" pitchFamily="18" charset="0"/>
+                          </a:rPr>
+                          <m:t>=0</m:t>
+                        </m:r>
+                      </m:e>
+                    </m:func>
+                  </m:oMath>
+                </a14:m>
+                <a:br>
+                  <a:rPr lang="it-IT" dirty="0"/>
+                </a:br>
+                <a:r>
+                  <a:rPr lang="it-IT" dirty="0"/>
+                  <a:t>è necessario che ci sia almeno un polo nell’origine in L(s);</a:t>
+                </a:r>
+                <a:br>
+                  <a:rPr lang="it-IT" dirty="0"/>
+                </a:br>
+                <a:r>
+                  <a:rPr lang="it-IT" dirty="0"/>
+                  <a:t>non essendoci in G(s)</a:t>
+                </a:r>
+                <a:r>
+                  <a:rPr lang="it-IT" dirty="0">
+                    <a:sym typeface="Wingdings" panose="05000000000000000000" pitchFamily="2" charset="2"/>
+                  </a:rPr>
+                  <a:t> deve essere inserito durante la sintesi del controllore R(s);</a:t>
+                </a:r>
+                <a:br>
+                  <a:rPr lang="it-IT" dirty="0"/>
+                </a:br>
+                <a:r>
+                  <a:rPr lang="it-IT" dirty="0"/>
+                  <a:t> </a:t>
+                </a:r>
+              </a:p>
+            </p:txBody>
+          </p:sp>
+        </mc:Choice>
+        <mc:Fallback>
+          <p:sp>
+            <p:nvSpPr>
+              <p:cNvPr id="2" name="Titolo 1">
+                <a:extLst>
+                  <a:ext uri="{FF2B5EF4-FFF2-40B4-BE49-F238E27FC236}">
+                    <a16:creationId xmlns:a16="http://schemas.microsoft.com/office/drawing/2014/main" id="{3C52B988-3418-401B-8D1B-F6246FE6A373}"/>
+                  </a:ext>
+                </a:extLst>
+              </p:cNvPr>
+              <p:cNvSpPr>
+                <a:spLocks noGrp="1" noRot="1" noChangeAspect="1" noMove="1" noResize="1" noEditPoints="1" noAdjustHandles="1" noChangeArrowheads="1" noChangeShapeType="1" noTextEdit="1"/>
+              </p:cNvSpPr>
+              <p:nvPr>
+                <p:ph type="title"/>
+              </p:nvPr>
+            </p:nvSpPr>
+            <p:spPr>
+              <a:xfrm>
+                <a:off x="838200" y="365125"/>
+                <a:ext cx="10515600" cy="5746917"/>
+              </a:xfrm>
+              <a:blipFill>
+                <a:blip r:embed="rId2"/>
+                <a:stretch>
+                  <a:fillRect l="-2377"/>
+                </a:stretch>
+              </a:blipFill>
+            </p:spPr>
+            <p:txBody>
+              <a:bodyPr/>
+              <a:lstStyle/>
+              <a:p>
+                <a:r>
+                  <a:rPr lang="it-IT">
+                    <a:noFill/>
+                  </a:rPr>
+                  <a:t> </a:t>
+                </a:r>
+              </a:p>
+            </p:txBody>
+          </p:sp>
+        </mc:Fallback>
+      </mc:AlternateContent>
+    </p:spTree>
+    <p:extLst>
+      <p:ext uri="{BB962C8B-B14F-4D97-AF65-F5344CB8AC3E}">
+        <p14:creationId xmlns:p14="http://schemas.microsoft.com/office/powerpoint/2010/main" val="2759229419"/>
+      </p:ext>
+    </p:extLst>
+  </p:cSld>
+  <p:clrMapOvr>
+    <a:masterClrMapping/>
+  </p:clrMapOvr>
+</p:sld>
+</file>
+
+<file path=ppt/slides/slide8.xml><?xml version="1.0" encoding="utf-8"?>
+<p:sld xmlns:a="http://schemas.openxmlformats.org/drawingml/2006/main" xmlns:r="http://schemas.openxmlformats.org/officeDocument/2006/relationships" xmlns:p="http://schemas.openxmlformats.org/presentationml/2006/main">
+  <p:cSld>
+    <p:spTree>
+      <p:nvGrpSpPr>
+        <p:cNvPr id="1" name=""/>
+        <p:cNvGrpSpPr/>
+        <p:nvPr/>
+      </p:nvGrpSpPr>
+      <p:grpSpPr>
+        <a:xfrm>
+          <a:off x="0" y="0"/>
+          <a:ext cx="0" cy="0"/>
+          <a:chOff x="0" y="0"/>
+          <a:chExt cx="0" cy="0"/>
+        </a:xfrm>
+      </p:grpSpPr>
+      <p:sp>
+        <p:nvSpPr>
+          <p:cNvPr id="2" name="Titolo 1">
+            <a:extLst>
+              <a:ext uri="{FF2B5EF4-FFF2-40B4-BE49-F238E27FC236}">
+                <a16:creationId xmlns:a16="http://schemas.microsoft.com/office/drawing/2014/main" id="{9EB32E31-6B33-43EA-9CC3-B81BADB5012B}"/>
+              </a:ext>
+            </a:extLst>
+          </p:cNvPr>
+          <p:cNvSpPr>
+            <a:spLocks noGrp="1"/>
+          </p:cNvSpPr>
+          <p:nvPr>
+            <p:ph type="title"/>
+          </p:nvPr>
+        </p:nvSpPr>
+        <p:spPr>
+          <a:xfrm>
+            <a:off x="838200" y="365125"/>
+            <a:ext cx="10515600" cy="5946898"/>
+          </a:xfrm>
+        </p:spPr>
+        <p:txBody>
+          <a:bodyPr>
+            <a:normAutofit/>
+          </a:bodyPr>
+          <a:lstStyle/>
+          <a:p>
+            <a:r>
+              <a:rPr lang="it-IT" dirty="0"/>
+              <a:t>Vincolo 2</a:t>
+            </a:r>
+            <a:br>
+              <a:rPr lang="it-IT" dirty="0"/>
+            </a:br>
+            <a:r>
+              <a:rPr lang="it-IT" dirty="0"/>
+              <a:t>margine di fase maggiore di 45….</a:t>
+            </a:r>
+            <a:br>
+              <a:rPr lang="it-IT" dirty="0"/>
+            </a:br>
+            <a:r>
+              <a:rPr lang="it-IT" dirty="0"/>
+              <a:t>Una volta ultimato il controllore vedremo se sarà necessario doverlo modificare ulteriormente per soddisfare tale vincolo.</a:t>
+            </a:r>
+            <a:br>
+              <a:rPr lang="it-IT" dirty="0"/>
+            </a:br>
+            <a:br>
+              <a:rPr lang="it-IT" dirty="0"/>
+            </a:br>
+            <a:endParaRPr lang="it-IT" dirty="0"/>
+          </a:p>
+        </p:txBody>
+      </p:sp>
+    </p:spTree>
+    <p:extLst>
+      <p:ext uri="{BB962C8B-B14F-4D97-AF65-F5344CB8AC3E}">
+        <p14:creationId xmlns:p14="http://schemas.microsoft.com/office/powerpoint/2010/main" val="349622875"/>
+      </p:ext>
+    </p:extLst>
+  </p:cSld>
+  <p:clrMapOvr>
+    <a:masterClrMapping/>
+  </p:clrMapOvr>
+</p:sld>
+</file>
+
+<file path=ppt/slides/slide9.xml><?xml version="1.0" encoding="utf-8"?>
+<p:sld xmlns:a="http://schemas.openxmlformats.org/drawingml/2006/main" xmlns:r="http://schemas.openxmlformats.org/officeDocument/2006/relationships" xmlns:p="http://schemas.openxmlformats.org/presentationml/2006/main">
+  <p:cSld>
+    <p:spTree>
+      <p:nvGrpSpPr>
+        <p:cNvPr id="1" name=""/>
+        <p:cNvGrpSpPr/>
+        <p:nvPr/>
+      </p:nvGrpSpPr>
+      <p:grpSpPr>
+        <a:xfrm>
+          <a:off x="0" y="0"/>
+          <a:ext cx="0" cy="0"/>
+          <a:chOff x="0" y="0"/>
+          <a:chExt cx="0" cy="0"/>
+        </a:xfrm>
+      </p:grpSpPr>
+      <mc:AlternateContent xmlns:mc="http://schemas.openxmlformats.org/markup-compatibility/2006">
+        <mc:Choice xmlns:a14="http://schemas.microsoft.com/office/drawing/2010/main" Requires="a14">
+          <p:sp>
+            <p:nvSpPr>
+              <p:cNvPr id="2" name="Titolo 1">
+                <a:extLst>
+                  <a:ext uri="{FF2B5EF4-FFF2-40B4-BE49-F238E27FC236}">
+                    <a16:creationId xmlns:a16="http://schemas.microsoft.com/office/drawing/2014/main" id="{536D1A00-9F80-41F1-A932-39429C90ABF4}"/>
+                  </a:ext>
+                </a:extLst>
+              </p:cNvPr>
+              <p:cNvSpPr>
+                <a:spLocks noGrp="1"/>
+              </p:cNvSpPr>
+              <p:nvPr>
+                <p:ph type="title"/>
+              </p:nvPr>
+            </p:nvSpPr>
+            <p:spPr>
+              <a:xfrm>
+                <a:off x="838200" y="365125"/>
+                <a:ext cx="10515600" cy="6177718"/>
+              </a:xfrm>
+            </p:spPr>
+            <p:txBody>
+              <a:bodyPr/>
+              <a:lstStyle/>
+              <a:p>
+                <a:r>
+                  <a:rPr lang="it-IT" dirty="0"/>
+                  <a:t>Vincolo 3</a:t>
+                </a:r>
+                <a:br>
+                  <a:rPr lang="it-IT" dirty="0"/>
+                </a:br>
+                <a:r>
+                  <a:rPr lang="it-IT" dirty="0" err="1"/>
+                  <a:t>sovraelongazione</a:t>
+                </a:r>
+                <a:r>
+                  <a:rPr lang="it-IT" dirty="0"/>
+                  <a:t> </a:t>
+                </a:r>
+                <a14:m>
+                  <m:oMath xmlns:m="http://schemas.openxmlformats.org/officeDocument/2006/math">
+                    <m:r>
+                      <a:rPr lang="it-IT" b="0" i="1" smtClean="0">
+                        <a:latin typeface="Cambria Math" panose="02040503050406030204" pitchFamily="18" charset="0"/>
+                      </a:rPr>
+                      <m:t>≤0,01;</m:t>
+                    </m:r>
+                  </m:oMath>
+                </a14:m>
+                <a:br>
+                  <a:rPr lang="it-IT" b="0" dirty="0"/>
+                </a:br>
+                <a:r>
+                  <a:rPr lang="it-IT" b="0" dirty="0"/>
+                  <a:t>o meglio S% massima = 1%;</a:t>
+                </a:r>
+                <a:br>
+                  <a:rPr lang="it-IT" b="0" dirty="0"/>
+                </a:br>
+                <a:r>
+                  <a:rPr lang="it-IT" sz="2400" dirty="0"/>
+                  <a:t>Ciò si traduce in un ulteriore vincolo sul margine di fase minimo calcolabile tramite la seguente formula:</a:t>
+                </a:r>
+                <a14:m>
+                  <m:oMath xmlns:m="http://schemas.openxmlformats.org/officeDocument/2006/math">
+                    <m:r>
+                      <a:rPr lang="it-IT" sz="2000" b="0" i="1" smtClean="0">
+                        <a:latin typeface="Cambria Math" panose="02040503050406030204" pitchFamily="18" charset="0"/>
+                      </a:rPr>
+                      <m:t>𝑆</m:t>
+                    </m:r>
+                    <m:r>
+                      <a:rPr lang="it-IT" sz="2000" b="0" i="1" smtClean="0">
+                        <a:latin typeface="Cambria Math" panose="02040503050406030204" pitchFamily="18" charset="0"/>
+                      </a:rPr>
+                      <m:t>%=</m:t>
+                    </m:r>
+                    <m:sSup>
+                      <m:sSupPr>
+                        <m:ctrlPr>
+                          <a:rPr lang="it-IT" sz="2000" b="0" i="1" smtClean="0">
+                            <a:latin typeface="Cambria Math" panose="02040503050406030204" pitchFamily="18" charset="0"/>
+                          </a:rPr>
+                        </m:ctrlPr>
+                      </m:sSupPr>
+                      <m:e>
+                        <m:r>
+                          <a:rPr lang="it-IT" sz="2000" b="0" i="1" smtClean="0">
+                            <a:latin typeface="Cambria Math" panose="02040503050406030204" pitchFamily="18" charset="0"/>
+                          </a:rPr>
+                          <m:t>𝑒</m:t>
+                        </m:r>
+                      </m:e>
+                      <m:sup>
+                        <m:r>
+                          <a:rPr lang="it-IT" sz="2000" b="0" i="1" smtClean="0">
+                            <a:latin typeface="Cambria Math" panose="02040503050406030204" pitchFamily="18" charset="0"/>
+                          </a:rPr>
+                          <m:t>−</m:t>
+                        </m:r>
+                        <m:f>
+                          <m:fPr>
+                            <m:ctrlPr>
+                              <a:rPr lang="it-IT" sz="2000" b="0" i="1" smtClean="0">
+                                <a:latin typeface="Cambria Math" panose="02040503050406030204" pitchFamily="18" charset="0"/>
+                              </a:rPr>
+                            </m:ctrlPr>
+                          </m:fPr>
+                          <m:num>
+                            <m:r>
+                              <a:rPr lang="it-IT" sz="2000" b="0" i="1" smtClean="0">
+                                <a:latin typeface="Cambria Math" panose="02040503050406030204" pitchFamily="18" charset="0"/>
+                                <a:ea typeface="Cambria Math" panose="02040503050406030204" pitchFamily="18" charset="0"/>
+                              </a:rPr>
+                              <m:t>𝜋</m:t>
+                            </m:r>
+                            <m:r>
+                              <m:rPr>
+                                <m:nor/>
+                              </m:rPr>
+                              <a:rPr lang="el-GR" sz="2000" b="1"/>
+                              <m:t>ξ</m:t>
+                            </m:r>
+                          </m:num>
+                          <m:den>
+                            <m:rad>
+                              <m:radPr>
+                                <m:degHide m:val="on"/>
+                                <m:ctrlPr>
+                                  <a:rPr lang="it-IT" sz="2000" b="0" i="1" smtClean="0">
+                                    <a:latin typeface="Cambria Math" panose="02040503050406030204" pitchFamily="18" charset="0"/>
+                                  </a:rPr>
+                                </m:ctrlPr>
+                              </m:radPr>
+                              <m:deg/>
+                              <m:e>
+                                <m:r>
+                                  <a:rPr lang="it-IT" sz="2000" b="0" i="1" smtClean="0">
+                                    <a:latin typeface="Cambria Math" panose="02040503050406030204" pitchFamily="18" charset="0"/>
+                                  </a:rPr>
+                                  <m:t>1−</m:t>
+                                </m:r>
+                                <m:sSup>
+                                  <m:sSupPr>
+                                    <m:ctrlPr>
+                                      <a:rPr lang="el-GR" sz="2000" b="1" i="1" smtClean="0">
+                                        <a:latin typeface="Cambria Math" panose="02040503050406030204" pitchFamily="18" charset="0"/>
+                                      </a:rPr>
+                                    </m:ctrlPr>
+                                  </m:sSupPr>
+                                  <m:e>
+                                    <m:r>
+                                      <m:rPr>
+                                        <m:nor/>
+                                      </m:rPr>
+                                      <a:rPr lang="el-GR" sz="2000" b="1"/>
+                                      <m:t>ξ</m:t>
+                                    </m:r>
+                                  </m:e>
+                                  <m:sup>
+                                    <m:r>
+                                      <a:rPr lang="it-IT" sz="2000" b="1" i="1" smtClean="0">
+                                        <a:latin typeface="Cambria Math" panose="02040503050406030204" pitchFamily="18" charset="0"/>
+                                      </a:rPr>
+                                      <m:t>𝟐</m:t>
+                                    </m:r>
+                                  </m:sup>
+                                </m:sSup>
+                              </m:e>
+                            </m:rad>
+                          </m:den>
+                        </m:f>
+                      </m:sup>
+                    </m:sSup>
+                  </m:oMath>
+                </a14:m>
+                <a:r>
+                  <a:rPr lang="it-IT" sz="2400" dirty="0"/>
+                  <a:t>      da cui ricaviamo che : </a:t>
+                </a:r>
+                <a14:m>
+                  <m:oMath xmlns:m="http://schemas.openxmlformats.org/officeDocument/2006/math">
+                    <m:r>
+                      <m:rPr>
+                        <m:nor/>
+                      </m:rPr>
+                      <a:rPr lang="el-GR" sz="2400" b="1"/>
+                      <m:t>ξ</m:t>
+                    </m:r>
+                    <m:r>
+                      <a:rPr lang="it-IT" sz="2400" b="0" i="0" smtClean="0">
+                        <a:latin typeface="Cambria Math" panose="02040503050406030204" pitchFamily="18" charset="0"/>
+                      </a:rPr>
+                      <m:t>=</m:t>
+                    </m:r>
+                    <m:rad>
+                      <m:radPr>
+                        <m:degHide m:val="on"/>
+                        <m:ctrlPr>
+                          <a:rPr lang="it-IT" sz="2400" i="1" smtClean="0">
+                            <a:latin typeface="Cambria Math" panose="02040503050406030204" pitchFamily="18" charset="0"/>
+                          </a:rPr>
+                        </m:ctrlPr>
+                      </m:radPr>
+                      <m:deg/>
+                      <m:e>
+                        <m:f>
+                          <m:fPr>
+                            <m:ctrlPr>
+                              <a:rPr lang="it-IT" sz="2400" i="1" smtClean="0">
+                                <a:latin typeface="Cambria Math" panose="02040503050406030204" pitchFamily="18" charset="0"/>
+                              </a:rPr>
+                            </m:ctrlPr>
+                          </m:fPr>
+                          <m:num>
+                            <m:sSup>
+                              <m:sSupPr>
+                                <m:ctrlPr>
+                                  <a:rPr lang="it-IT" sz="2400" i="1" smtClean="0">
+                                    <a:latin typeface="Cambria Math" panose="02040503050406030204" pitchFamily="18" charset="0"/>
+                                  </a:rPr>
+                                </m:ctrlPr>
+                              </m:sSupPr>
+                              <m:e>
+                                <m:func>
+                                  <m:funcPr>
+                                    <m:ctrlPr>
+                                      <a:rPr lang="it-IT" sz="2400" i="1">
+                                        <a:latin typeface="Cambria Math" panose="02040503050406030204" pitchFamily="18" charset="0"/>
+                                      </a:rPr>
+                                    </m:ctrlPr>
+                                  </m:funcPr>
+                                  <m:fName>
+                                    <m:r>
+                                      <m:rPr>
+                                        <m:sty m:val="p"/>
+                                      </m:rPr>
+                                      <a:rPr lang="it-IT" sz="2400">
+                                        <a:latin typeface="Cambria Math" panose="02040503050406030204" pitchFamily="18" charset="0"/>
+                                      </a:rPr>
+                                      <m:t>log</m:t>
+                                    </m:r>
+                                  </m:fName>
+                                  <m:e>
+                                    <m:sSub>
+                                      <m:sSubPr>
+                                        <m:ctrlPr>
+                                          <a:rPr lang="it-IT" sz="2400" i="1">
+                                            <a:latin typeface="Cambria Math" panose="02040503050406030204" pitchFamily="18" charset="0"/>
+                                          </a:rPr>
+                                        </m:ctrlPr>
+                                      </m:sSubPr>
+                                      <m:e>
+                                        <m:r>
+                                          <a:rPr lang="it-IT" sz="2400" i="1">
+                                            <a:latin typeface="Cambria Math" panose="02040503050406030204" pitchFamily="18" charset="0"/>
+                                          </a:rPr>
+                                          <m:t>(</m:t>
+                                        </m:r>
+                                        <m:r>
+                                          <a:rPr lang="it-IT" sz="2400" i="1">
+                                            <a:latin typeface="Cambria Math" panose="02040503050406030204" pitchFamily="18" charset="0"/>
+                                          </a:rPr>
+                                          <m:t>𝑆</m:t>
+                                        </m:r>
+                                        <m:r>
+                                          <a:rPr lang="it-IT" sz="2400" i="1">
+                                            <a:latin typeface="Cambria Math" panose="02040503050406030204" pitchFamily="18" charset="0"/>
+                                          </a:rPr>
+                                          <m:t>%</m:t>
+                                        </m:r>
+                                      </m:e>
+                                      <m:sub>
+                                        <m:r>
+                                          <a:rPr lang="it-IT" sz="2400" i="1">
+                                            <a:latin typeface="Cambria Math" panose="02040503050406030204" pitchFamily="18" charset="0"/>
+                                          </a:rPr>
+                                          <m:t>𝑚𝑎𝑥</m:t>
+                                        </m:r>
+                                      </m:sub>
+                                    </m:sSub>
+                                    <m:r>
+                                      <a:rPr lang="it-IT" sz="2400" i="1">
+                                        <a:latin typeface="Cambria Math" panose="02040503050406030204" pitchFamily="18" charset="0"/>
+                                      </a:rPr>
+                                      <m:t>) </m:t>
+                                    </m:r>
+                                  </m:e>
+                                </m:func>
+                              </m:e>
+                              <m:sup>
+                                <m:r>
+                                  <a:rPr lang="it-IT" sz="2400" b="0" i="1" smtClean="0">
+                                    <a:latin typeface="Cambria Math" panose="02040503050406030204" pitchFamily="18" charset="0"/>
+                                  </a:rPr>
+                                  <m:t>2</m:t>
+                                </m:r>
+                              </m:sup>
+                            </m:sSup>
+                          </m:num>
+                          <m:den>
+                            <m:sSup>
+                              <m:sSupPr>
+                                <m:ctrlPr>
+                                  <a:rPr lang="it-IT" sz="2400" i="1" smtClean="0">
+                                    <a:latin typeface="Cambria Math" panose="02040503050406030204" pitchFamily="18" charset="0"/>
+                                  </a:rPr>
+                                </m:ctrlPr>
+                              </m:sSupPr>
+                              <m:e>
+                                <m:r>
+                                  <a:rPr lang="it-IT" sz="2400" i="1" smtClean="0">
+                                    <a:latin typeface="Cambria Math" panose="02040503050406030204" pitchFamily="18" charset="0"/>
+                                    <a:ea typeface="Cambria Math" panose="02040503050406030204" pitchFamily="18" charset="0"/>
+                                  </a:rPr>
+                                  <m:t>𝜋</m:t>
+                                </m:r>
+                              </m:e>
+                              <m:sup>
+                                <m:r>
+                                  <a:rPr lang="it-IT" sz="2400" b="0" i="1" smtClean="0">
+                                    <a:latin typeface="Cambria Math" panose="02040503050406030204" pitchFamily="18" charset="0"/>
+                                  </a:rPr>
+                                  <m:t>2</m:t>
+                                </m:r>
+                              </m:sup>
+                            </m:sSup>
+                            <m:r>
+                              <a:rPr lang="it-IT" sz="2400" b="0" i="1" smtClean="0">
+                                <a:latin typeface="Cambria Math" panose="02040503050406030204" pitchFamily="18" charset="0"/>
+                              </a:rPr>
+                              <m:t>+</m:t>
+                            </m:r>
+                            <m:sSup>
+                              <m:sSupPr>
+                                <m:ctrlPr>
+                                  <a:rPr lang="it-IT" sz="2400" i="1">
+                                    <a:latin typeface="Cambria Math" panose="02040503050406030204" pitchFamily="18" charset="0"/>
+                                  </a:rPr>
+                                </m:ctrlPr>
+                              </m:sSupPr>
+                              <m:e>
+                                <m:func>
+                                  <m:funcPr>
+                                    <m:ctrlPr>
+                                      <a:rPr lang="it-IT" sz="2400" i="1">
+                                        <a:latin typeface="Cambria Math" panose="02040503050406030204" pitchFamily="18" charset="0"/>
+                                      </a:rPr>
+                                    </m:ctrlPr>
+                                  </m:funcPr>
+                                  <m:fName>
+                                    <m:r>
+                                      <m:rPr>
+                                        <m:sty m:val="p"/>
+                                      </m:rPr>
+                                      <a:rPr lang="it-IT" sz="2400">
+                                        <a:latin typeface="Cambria Math" panose="02040503050406030204" pitchFamily="18" charset="0"/>
+                                      </a:rPr>
+                                      <m:t>log</m:t>
+                                    </m:r>
+                                  </m:fName>
+                                  <m:e>
+                                    <m:sSub>
+                                      <m:sSubPr>
+                                        <m:ctrlPr>
+                                          <a:rPr lang="it-IT" sz="2400" i="1">
+                                            <a:latin typeface="Cambria Math" panose="02040503050406030204" pitchFamily="18" charset="0"/>
+                                          </a:rPr>
+                                        </m:ctrlPr>
+                                      </m:sSubPr>
+                                      <m:e>
+                                        <m:r>
+                                          <a:rPr lang="it-IT" sz="2400" i="1">
+                                            <a:latin typeface="Cambria Math" panose="02040503050406030204" pitchFamily="18" charset="0"/>
+                                          </a:rPr>
+                                          <m:t>(</m:t>
+                                        </m:r>
+                                        <m:r>
+                                          <a:rPr lang="it-IT" sz="2400" i="1">
+                                            <a:latin typeface="Cambria Math" panose="02040503050406030204" pitchFamily="18" charset="0"/>
+                                          </a:rPr>
+                                          <m:t>𝑆</m:t>
+                                        </m:r>
+                                        <m:r>
+                                          <a:rPr lang="it-IT" sz="2400" i="1">
+                                            <a:latin typeface="Cambria Math" panose="02040503050406030204" pitchFamily="18" charset="0"/>
+                                          </a:rPr>
+                                          <m:t>%</m:t>
+                                        </m:r>
+                                      </m:e>
+                                      <m:sub>
+                                        <m:r>
+                                          <a:rPr lang="it-IT" sz="2400" i="1">
+                                            <a:latin typeface="Cambria Math" panose="02040503050406030204" pitchFamily="18" charset="0"/>
+                                          </a:rPr>
+                                          <m:t>𝑚𝑎𝑥</m:t>
+                                        </m:r>
+                                      </m:sub>
+                                    </m:sSub>
+                                    <m:r>
+                                      <a:rPr lang="it-IT" sz="2400" i="1">
+                                        <a:latin typeface="Cambria Math" panose="02040503050406030204" pitchFamily="18" charset="0"/>
+                                      </a:rPr>
+                                      <m:t>) </m:t>
+                                    </m:r>
+                                  </m:e>
+                                </m:func>
+                              </m:e>
+                              <m:sup>
+                                <m:r>
+                                  <a:rPr lang="it-IT" sz="2400" i="1">
+                                    <a:latin typeface="Cambria Math" panose="02040503050406030204" pitchFamily="18" charset="0"/>
+                                  </a:rPr>
+                                  <m:t>2</m:t>
+                                </m:r>
+                              </m:sup>
+                            </m:sSup>
+                          </m:den>
+                        </m:f>
+                      </m:e>
+                    </m:rad>
+                  </m:oMath>
+                </a14:m>
+                <a:r>
+                  <a:rPr lang="it-IT" sz="2400" dirty="0"/>
+                  <a:t> </a:t>
+                </a:r>
+                <a:br>
+                  <a:rPr lang="it-IT" sz="2400" dirty="0"/>
+                </a:br>
+                <a:br>
+                  <a:rPr lang="it-IT" sz="2400" dirty="0"/>
+                </a:br>
+                <a:br>
+                  <a:rPr lang="it-IT" sz="2400" dirty="0"/>
+                </a:br>
+                <a:r>
+                  <a:rPr lang="it-IT" sz="2400" dirty="0" err="1"/>
+                  <a:t>Finally</a:t>
+                </a:r>
+                <a:r>
+                  <a:rPr lang="it-IT" sz="2400" dirty="0"/>
+                  <a:t> si può ricavare il margine di fase tramite la seguente formula ricavata a lezione:</a:t>
+                </a:r>
+                <a14:m>
+                  <m:oMath xmlns:m="http://schemas.openxmlformats.org/officeDocument/2006/math">
+                    <m:sSub>
+                      <m:sSubPr>
+                        <m:ctrlPr>
+                          <a:rPr lang="it-IT" sz="2400" i="1" smtClean="0">
+                            <a:latin typeface="Cambria Math" panose="02040503050406030204" pitchFamily="18" charset="0"/>
+                          </a:rPr>
+                        </m:ctrlPr>
+                      </m:sSubPr>
+                      <m:e>
+                        <m:r>
+                          <a:rPr lang="it-IT" sz="2400" b="0" i="1" smtClean="0">
+                            <a:latin typeface="Cambria Math" panose="02040503050406030204" pitchFamily="18" charset="0"/>
+                          </a:rPr>
+                          <m:t>𝑀</m:t>
+                        </m:r>
+                      </m:e>
+                      <m:sub>
+                        <m:r>
+                          <a:rPr lang="it-IT" sz="2400" b="0" i="1" smtClean="0">
+                            <a:latin typeface="Cambria Math" panose="02040503050406030204" pitchFamily="18" charset="0"/>
+                          </a:rPr>
+                          <m:t>𝑓</m:t>
+                        </m:r>
+                        <m:r>
+                          <a:rPr lang="it-IT" sz="2400" b="0" i="1" smtClean="0">
+                            <a:latin typeface="Cambria Math" panose="02040503050406030204" pitchFamily="18" charset="0"/>
+                          </a:rPr>
+                          <m:t>,</m:t>
+                        </m:r>
+                        <m:r>
+                          <a:rPr lang="it-IT" sz="2400" b="0" i="1" smtClean="0">
+                            <a:latin typeface="Cambria Math" panose="02040503050406030204" pitchFamily="18" charset="0"/>
+                          </a:rPr>
+                          <m:t>𝑚𝑖𝑛</m:t>
+                        </m:r>
+                      </m:sub>
+                    </m:sSub>
+                    <m:r>
+                      <a:rPr lang="it-IT" sz="2400" b="0" i="1" smtClean="0">
+                        <a:latin typeface="Cambria Math" panose="02040503050406030204" pitchFamily="18" charset="0"/>
+                      </a:rPr>
+                      <m:t>=</m:t>
+                    </m:r>
+                    <m:r>
+                      <m:rPr>
+                        <m:nor/>
+                      </m:rPr>
+                      <a:rPr lang="el-GR" sz="2400" b="1"/>
+                      <m:t>ξ</m:t>
+                    </m:r>
+                    <m:r>
+                      <a:rPr lang="el-GR" sz="2400" b="1" i="1" smtClean="0">
+                        <a:latin typeface="Cambria Math" panose="02040503050406030204" pitchFamily="18" charset="0"/>
+                        <a:ea typeface="Cambria Math" panose="02040503050406030204" pitchFamily="18" charset="0"/>
+                      </a:rPr>
+                      <m:t>∙</m:t>
+                    </m:r>
+                    <m:r>
+                      <a:rPr lang="it-IT" sz="2400" b="1" i="1" smtClean="0">
+                        <a:latin typeface="Cambria Math" panose="02040503050406030204" pitchFamily="18" charset="0"/>
+                        <a:ea typeface="Cambria Math" panose="02040503050406030204" pitchFamily="18" charset="0"/>
+                      </a:rPr>
+                      <m:t>𝟏𝟎𝟎</m:t>
+                    </m:r>
+                  </m:oMath>
+                </a14:m>
+                <a:br>
+                  <a:rPr lang="it-IT" sz="2400" b="1" dirty="0">
+                    <a:ea typeface="Cambria Math" panose="02040503050406030204" pitchFamily="18" charset="0"/>
+                  </a:rPr>
+                </a:br>
+                <a:r>
+                  <a:rPr lang="it-IT" sz="2400" dirty="0"/>
+                  <a:t> </a:t>
+                </a:r>
+                <a:br>
+                  <a:rPr lang="it-IT" sz="2400" dirty="0"/>
+                </a:br>
+                <a:r>
+                  <a:rPr lang="it-IT" sz="2400" dirty="0"/>
+                  <a:t>facendo i calcoli ci viene che </a:t>
+                </a:r>
+                <a:r>
+                  <a:rPr lang="it-IT" sz="2400" dirty="0">
+                    <a:sym typeface="Wingdings" panose="05000000000000000000" pitchFamily="2" charset="2"/>
+                  </a:rPr>
+                  <a:t> </a:t>
+                </a:r>
+                <a14:m>
+                  <m:oMath xmlns:m="http://schemas.openxmlformats.org/officeDocument/2006/math">
+                    <m:sSub>
+                      <m:sSubPr>
+                        <m:ctrlPr>
+                          <a:rPr lang="it-IT" sz="2400" i="1">
+                            <a:latin typeface="Cambria Math" panose="02040503050406030204" pitchFamily="18" charset="0"/>
+                          </a:rPr>
+                        </m:ctrlPr>
+                      </m:sSubPr>
+                      <m:e>
+                        <m:r>
+                          <a:rPr lang="it-IT" sz="2400" i="1">
+                            <a:latin typeface="Cambria Math" panose="02040503050406030204" pitchFamily="18" charset="0"/>
+                          </a:rPr>
+                          <m:t>𝑀</m:t>
+                        </m:r>
+                      </m:e>
+                      <m:sub>
+                        <m:r>
+                          <a:rPr lang="it-IT" sz="2400" i="1">
+                            <a:latin typeface="Cambria Math" panose="02040503050406030204" pitchFamily="18" charset="0"/>
+                          </a:rPr>
+                          <m:t>𝑓</m:t>
+                        </m:r>
+                        <m:r>
+                          <a:rPr lang="it-IT" sz="2400" i="1">
+                            <a:latin typeface="Cambria Math" panose="02040503050406030204" pitchFamily="18" charset="0"/>
+                          </a:rPr>
+                          <m:t>,</m:t>
+                        </m:r>
+                        <m:r>
+                          <a:rPr lang="it-IT" sz="2400" i="1">
+                            <a:latin typeface="Cambria Math" panose="02040503050406030204" pitchFamily="18" charset="0"/>
+                          </a:rPr>
+                          <m:t>𝑚𝑖𝑛</m:t>
+                        </m:r>
+                      </m:sub>
+                    </m:sSub>
+                    <m:r>
+                      <a:rPr lang="it-IT" sz="2400" b="0" i="1" smtClean="0">
+                        <a:latin typeface="Cambria Math" panose="02040503050406030204" pitchFamily="18" charset="0"/>
+                      </a:rPr>
+                      <m:t>=</m:t>
+                    </m:r>
+                    <m:r>
+                      <a:rPr lang="it-IT" sz="2400" b="0" i="0" smtClean="0">
+                        <a:latin typeface="Cambria Math" panose="02040503050406030204" pitchFamily="18" charset="0"/>
+                      </a:rPr>
+                      <m:t>100</m:t>
+                    </m:r>
+                    <m:r>
+                      <a:rPr lang="it-IT" sz="2400" b="0" i="1" smtClean="0">
+                        <a:latin typeface="Cambria Math" panose="02040503050406030204" pitchFamily="18" charset="0"/>
+                        <a:ea typeface="Cambria Math" panose="02040503050406030204" pitchFamily="18" charset="0"/>
+                      </a:rPr>
+                      <m:t>∙</m:t>
+                    </m:r>
+                  </m:oMath>
+                </a14:m>
+                <a:br>
+                  <a:rPr lang="it-IT" dirty="0"/>
+                </a:br>
+                <a:r>
+                  <a:rPr lang="it-IT" sz="2400" dirty="0"/>
+                  <a:t>Ne deduciamo che </a:t>
+                </a:r>
+                <a:r>
+                  <a:rPr lang="it-IT" sz="2400" dirty="0" err="1"/>
+                  <a:t>soddisfando</a:t>
+                </a:r>
+                <a:r>
+                  <a:rPr lang="it-IT" sz="2400" dirty="0"/>
+                  <a:t> il vincolo 3 soddisfiamo anche il vincolo 2, in quanto 54 è un margine di fase minimo più restrittivo;</a:t>
+                </a:r>
+                <a:endParaRPr lang="it-IT" dirty="0"/>
+              </a:p>
+            </p:txBody>
+          </p:sp>
+        </mc:Choice>
+        <mc:Fallback>
+          <p:sp>
+            <p:nvSpPr>
+              <p:cNvPr id="2" name="Titolo 1">
+                <a:extLst>
+                  <a:ext uri="{FF2B5EF4-FFF2-40B4-BE49-F238E27FC236}">
+                    <a16:creationId xmlns:a16="http://schemas.microsoft.com/office/drawing/2014/main" id="{536D1A00-9F80-41F1-A932-39429C90ABF4}"/>
+                  </a:ext>
+                </a:extLst>
+              </p:cNvPr>
+              <p:cNvSpPr>
+                <a:spLocks noGrp="1" noRot="1" noChangeAspect="1" noMove="1" noResize="1" noEditPoints="1" noAdjustHandles="1" noChangeArrowheads="1" noChangeShapeType="1" noTextEdit="1"/>
+              </p:cNvSpPr>
+              <p:nvPr>
+                <p:ph type="title"/>
+              </p:nvPr>
+            </p:nvSpPr>
+            <p:spPr>
+              <a:xfrm>
+                <a:off x="838200" y="365125"/>
+                <a:ext cx="10515600" cy="6177718"/>
+              </a:xfrm>
+              <a:blipFill>
+                <a:blip r:embed="rId2"/>
+                <a:stretch>
+                  <a:fillRect l="-2377" r="-1391"/>
+                </a:stretch>
+              </a:blipFill>
+            </p:spPr>
+            <p:txBody>
+              <a:bodyPr/>
+              <a:lstStyle/>
+              <a:p>
+                <a:r>
+                  <a:rPr lang="it-IT">
+                    <a:noFill/>
+                  </a:rPr>
+                  <a:t> </a:t>
+                </a:r>
+              </a:p>
+            </p:txBody>
+          </p:sp>
+        </mc:Fallback>
+      </mc:AlternateContent>
+      <p:pic>
+        <p:nvPicPr>
+          <p:cNvPr id="4" name="Immagine 3">
+            <a:extLst>
+              <a:ext uri="{FF2B5EF4-FFF2-40B4-BE49-F238E27FC236}">
+                <a16:creationId xmlns:a16="http://schemas.microsoft.com/office/drawing/2014/main" id="{8BD29D13-66C6-4029-93ED-1240A6300462}"/>
+              </a:ext>
+            </a:extLst>
+          </p:cNvPr>
+          <p:cNvPicPr>
+            <a:picLocks noChangeAspect="1"/>
+          </p:cNvPicPr>
+          <p:nvPr/>
+        </p:nvPicPr>
+        <p:blipFill>
+          <a:blip r:embed="rId3"/>
+          <a:stretch>
+            <a:fillRect/>
+          </a:stretch>
+        </p:blipFill>
+        <p:spPr>
+          <a:xfrm>
+            <a:off x="6757848" y="5202315"/>
+            <a:ext cx="1674516" cy="356864"/>
+          </a:xfrm>
+          <a:prstGeom prst="rect">
+            <a:avLst/>
+          </a:prstGeom>
+        </p:spPr>
+      </p:pic>
+      <mc:AlternateContent xmlns:mc="http://schemas.openxmlformats.org/markup-compatibility/2006">
+        <mc:Choice xmlns:a14="http://schemas.microsoft.com/office/drawing/2010/main" Requires="a14">
+          <p:sp>
+            <p:nvSpPr>
+              <p:cNvPr id="5" name="CasellaDiTesto 4">
+                <a:extLst>
+                  <a:ext uri="{FF2B5EF4-FFF2-40B4-BE49-F238E27FC236}">
+                    <a16:creationId xmlns:a16="http://schemas.microsoft.com/office/drawing/2014/main" id="{5C614A0B-9E74-485D-8923-3AB45CFEF5ED}"/>
+                  </a:ext>
+                </a:extLst>
+              </p:cNvPr>
+              <p:cNvSpPr txBox="1"/>
+              <p:nvPr/>
+            </p:nvSpPr>
+            <p:spPr>
+              <a:xfrm>
+                <a:off x="8584706" y="5189847"/>
+                <a:ext cx="731290" cy="369332"/>
+              </a:xfrm>
+              <a:prstGeom prst="rect">
+                <a:avLst/>
+              </a:prstGeom>
+              <a:noFill/>
+            </p:spPr>
+            <p:txBody>
+              <a:bodyPr wrap="none" rtlCol="0">
+                <a:spAutoFit/>
+              </a:bodyPr>
+              <a:lstStyle/>
+              <a:p>
+                <a14:m>
+                  <m:oMathPara xmlns:m="http://schemas.openxmlformats.org/officeDocument/2006/math">
+                    <m:oMathParaPr>
+                      <m:jc m:val="centerGroup"/>
+                    </m:oMathParaPr>
+                    <m:oMath xmlns:m="http://schemas.openxmlformats.org/officeDocument/2006/math">
+                      <m:r>
+                        <a:rPr lang="it-IT" i="1" smtClean="0">
+                          <a:latin typeface="Cambria Math" panose="02040503050406030204" pitchFamily="18" charset="0"/>
+                          <a:ea typeface="Cambria Math" panose="02040503050406030204" pitchFamily="18" charset="0"/>
+                        </a:rPr>
+                        <m:t>≅</m:t>
+                      </m:r>
+                      <m:r>
+                        <a:rPr lang="it-IT" b="0" i="1" smtClean="0">
+                          <a:latin typeface="Cambria Math" panose="02040503050406030204" pitchFamily="18" charset="0"/>
+                          <a:ea typeface="Cambria Math" panose="02040503050406030204" pitchFamily="18" charset="0"/>
+                        </a:rPr>
+                        <m:t>54</m:t>
+                      </m:r>
+                    </m:oMath>
+                  </m:oMathPara>
+                </a14:m>
+                <a:endParaRPr lang="it-IT" dirty="0"/>
+              </a:p>
+            </p:txBody>
+          </p:sp>
+        </mc:Choice>
+        <mc:Fallback>
+          <p:sp>
+            <p:nvSpPr>
+              <p:cNvPr id="5" name="CasellaDiTesto 4">
+                <a:extLst>
+                  <a:ext uri="{FF2B5EF4-FFF2-40B4-BE49-F238E27FC236}">
+                    <a16:creationId xmlns:a16="http://schemas.microsoft.com/office/drawing/2014/main" id="{5C614A0B-9E74-485D-8923-3AB45CFEF5ED}"/>
+                  </a:ext>
+                </a:extLst>
+              </p:cNvPr>
+              <p:cNvSpPr txBox="1">
+                <a:spLocks noRot="1" noChangeAspect="1" noMove="1" noResize="1" noEditPoints="1" noAdjustHandles="1" noChangeArrowheads="1" noChangeShapeType="1" noTextEdit="1"/>
+              </p:cNvSpPr>
+              <p:nvPr/>
+            </p:nvSpPr>
+            <p:spPr>
+              <a:xfrm>
+                <a:off x="8584706" y="5189847"/>
+                <a:ext cx="731290" cy="369332"/>
+              </a:xfrm>
+              <a:prstGeom prst="rect">
+                <a:avLst/>
+              </a:prstGeom>
+              <a:blipFill>
+                <a:blip r:embed="rId4"/>
+                <a:stretch>
+                  <a:fillRect/>
+                </a:stretch>
+              </a:blipFill>
+            </p:spPr>
+            <p:txBody>
+              <a:bodyPr/>
+              <a:lstStyle/>
+              <a:p>
+                <a:r>
+                  <a:rPr lang="it-IT">
+                    <a:noFill/>
+                  </a:rPr>
+                  <a:t> </a:t>
+                </a:r>
+              </a:p>
+            </p:txBody>
+          </p:sp>
+        </mc:Fallback>
+      </mc:AlternateContent>
+    </p:spTree>
+    <p:extLst>
+      <p:ext uri="{BB962C8B-B14F-4D97-AF65-F5344CB8AC3E}">
+        <p14:creationId xmlns:p14="http://schemas.microsoft.com/office/powerpoint/2010/main" val="3134232712"/>
       </p:ext>
     </p:extLst>
   </p:cSld>

</xml_diff>